<commit_message>
added mtop to data vs mc to perform fit in this region also
</commit_message>
<xml_diff>
--- a/Weekly Meetings/HEP_Weekly_24June2020.pptx
+++ b/Weekly Meetings/HEP_Weekly_24June2020.pptx
@@ -227,7 +227,7 @@
           <a:p>
             <a:fld id="{EC97F6CE-C9BA-5B44-AF0F-C73B1C17650F}" type="datetime1">
               <a:rPr lang="en-US" smtClean="0"/>
-              <a:t>6/23/20</a:t>
+              <a:t>6/24/20</a:t>
             </a:fld>
             <a:endParaRPr lang="en-GB"/>
           </a:p>
@@ -433,7 +433,7 @@
           <a:p>
             <a:fld id="{7F9D4A26-E586-E648-884B-C9B1EA03133F}" type="datetime1">
               <a:rPr lang="en-US" smtClean="0"/>
-              <a:t>6/23/20</a:t>
+              <a:t>6/24/20</a:t>
             </a:fld>
             <a:endParaRPr lang="en-GB"/>
           </a:p>
@@ -767,7 +767,7 @@
           <a:p>
             <a:fld id="{33D9703A-F6B0-E34C-B7F9-5A8864FF4F07}" type="datetime1">
               <a:rPr lang="en-US" smtClean="0"/>
-              <a:t>6/23/20</a:t>
+              <a:t>6/24/20</a:t>
             </a:fld>
             <a:endParaRPr lang="en-GB"/>
           </a:p>
@@ -1035,7 +1035,7 @@
           <a:p>
             <a:fld id="{DC51A3BE-CA11-4547-A39A-766971096B34}" type="datetime1">
               <a:rPr lang="en-US" smtClean="0"/>
-              <a:t>6/23/20</a:t>
+              <a:t>6/24/20</a:t>
             </a:fld>
             <a:endParaRPr lang="en-US" dirty="0"/>
           </a:p>
@@ -1242,7 +1242,7 @@
           <a:p>
             <a:fld id="{42B2CF9A-A7BF-1245-99D9-4054301C36E0}" type="datetime1">
               <a:rPr lang="en-US" smtClean="0"/>
-              <a:t>6/23/20</a:t>
+              <a:t>6/24/20</a:t>
             </a:fld>
             <a:endParaRPr lang="en-US" dirty="0"/>
           </a:p>
@@ -1497,7 +1497,7 @@
           <a:p>
             <a:fld id="{F88F3968-5050-1740-9AB7-A06844E87E5F}" type="datetime1">
               <a:rPr lang="en-US" smtClean="0"/>
-              <a:t>6/23/20</a:t>
+              <a:t>6/24/20</a:t>
             </a:fld>
             <a:endParaRPr lang="en-US" dirty="0"/>
           </a:p>
@@ -1688,7 +1688,7 @@
           <a:p>
             <a:fld id="{6A19A844-E33A-B644-A0FB-7455E93D924C}" type="datetime1">
               <a:rPr lang="en-US" smtClean="0"/>
-              <a:t>6/23/20</a:t>
+              <a:t>6/24/20</a:t>
             </a:fld>
             <a:endParaRPr lang="en-GB"/>
           </a:p>
@@ -1862,7 +1862,7 @@
           <a:p>
             <a:fld id="{F61E92BF-DA59-B546-88AE-9835521A3798}" type="datetime1">
               <a:rPr lang="en-US" smtClean="0"/>
-              <a:t>6/23/20</a:t>
+              <a:t>6/24/20</a:t>
             </a:fld>
             <a:endParaRPr lang="en-GB"/>
           </a:p>
@@ -2112,7 +2112,7 @@
           <a:p>
             <a:fld id="{61C78CAC-926A-EF4D-9608-460C3A301243}" type="datetime1">
               <a:rPr lang="en-US" smtClean="0"/>
-              <a:t>6/23/20</a:t>
+              <a:t>6/24/20</a:t>
             </a:fld>
             <a:endParaRPr lang="en-GB"/>
           </a:p>
@@ -2348,7 +2348,7 @@
           <a:p>
             <a:fld id="{32675A6D-6B9B-6546-A3DC-004E809EED54}" type="datetime1">
               <a:rPr lang="en-US" smtClean="0"/>
-              <a:t>6/23/20</a:t>
+              <a:t>6/24/20</a:t>
             </a:fld>
             <a:endParaRPr lang="en-GB"/>
           </a:p>
@@ -2719,7 +2719,7 @@
           <a:p>
             <a:fld id="{55D89806-B328-B147-9EC9-15D0307996ED}" type="datetime1">
               <a:rPr lang="en-US" smtClean="0"/>
-              <a:t>6/23/20</a:t>
+              <a:t>6/24/20</a:t>
             </a:fld>
             <a:endParaRPr lang="en-GB"/>
           </a:p>
@@ -2841,7 +2841,7 @@
           <a:p>
             <a:fld id="{702FE0D6-14B8-A94B-B441-7BA984189CE2}" type="datetime1">
               <a:rPr lang="en-US" smtClean="0"/>
-              <a:t>6/23/20</a:t>
+              <a:t>6/24/20</a:t>
             </a:fld>
             <a:endParaRPr lang="en-GB"/>
           </a:p>
@@ -2940,7 +2940,7 @@
           <a:p>
             <a:fld id="{4C294EA8-7AEB-3247-9A81-8483D03B0462}" type="datetime1">
               <a:rPr lang="en-US" smtClean="0"/>
-              <a:t>6/23/20</a:t>
+              <a:t>6/24/20</a:t>
             </a:fld>
             <a:endParaRPr lang="en-GB"/>
           </a:p>
@@ -3221,7 +3221,7 @@
           <a:p>
             <a:fld id="{D72E9315-386E-6846-8498-4330F1BBFC0A}" type="datetime1">
               <a:rPr lang="en-US" smtClean="0"/>
-              <a:t>6/23/20</a:t>
+              <a:t>6/24/20</a:t>
             </a:fld>
             <a:endParaRPr lang="en-GB"/>
           </a:p>
@@ -3377,7 +3377,7 @@
           <a:p>
             <a:fld id="{0E394EB9-E681-C34A-89D4-D81E4C62EA5B}" type="datetime1">
               <a:rPr lang="en-US" smtClean="0"/>
-              <a:t>6/23/20</a:t>
+              <a:t>6/24/20</a:t>
             </a:fld>
             <a:endParaRPr lang="en-US" dirty="0"/>
           </a:p>
@@ -3658,7 +3658,7 @@
           <a:p>
             <a:fld id="{E220BF5D-E794-2B42-91EC-2A3B4450069D}" type="datetime1">
               <a:rPr lang="en-US" smtClean="0"/>
-              <a:t>6/23/20</a:t>
+              <a:t>6/24/20</a:t>
             </a:fld>
             <a:endParaRPr lang="en-GB"/>
           </a:p>
@@ -3832,7 +3832,7 @@
           <a:p>
             <a:fld id="{BA4C039E-7082-7D42-AA91-9FF3EF6ADB5B}" type="datetime1">
               <a:rPr lang="en-US" smtClean="0"/>
-              <a:t>6/23/20</a:t>
+              <a:t>6/24/20</a:t>
             </a:fld>
             <a:endParaRPr lang="en-GB"/>
           </a:p>
@@ -4016,7 +4016,7 @@
           <a:p>
             <a:fld id="{2817B3FE-3894-A848-8D78-14007FB2FF94}" type="datetime1">
               <a:rPr lang="en-US" smtClean="0"/>
-              <a:t>6/23/20</a:t>
+              <a:t>6/24/20</a:t>
             </a:fld>
             <a:endParaRPr lang="en-GB"/>
           </a:p>
@@ -4363,7 +4363,7 @@
           <a:p>
             <a:fld id="{2DEEC64B-3E48-2F44-A6A9-A1C06A2C021E}" type="datetime1">
               <a:rPr lang="en-US" smtClean="0"/>
-              <a:t>6/23/20</a:t>
+              <a:t>6/24/20</a:t>
             </a:fld>
             <a:endParaRPr lang="en-US" dirty="0"/>
           </a:p>
@@ -4637,7 +4637,7 @@
           <a:p>
             <a:fld id="{61E195D8-183A-7F4D-8D17-8ADC90214B8A}" type="datetime1">
               <a:rPr lang="en-US" smtClean="0"/>
-              <a:t>6/23/20</a:t>
+              <a:t>6/24/20</a:t>
             </a:fld>
             <a:endParaRPr lang="en-US" dirty="0"/>
           </a:p>
@@ -5015,7 +5015,7 @@
           <a:p>
             <a:fld id="{0DD0A991-48AE-1D43-8113-23F8EAF6681B}" type="datetime1">
               <a:rPr lang="en-US" smtClean="0"/>
-              <a:t>6/23/20</a:t>
+              <a:t>6/24/20</a:t>
             </a:fld>
             <a:endParaRPr lang="en-US" dirty="0"/>
           </a:p>
@@ -5132,7 +5132,7 @@
           <a:p>
             <a:fld id="{DC12579A-EC7F-EB4A-BC5C-80733D051D29}" type="datetime1">
               <a:rPr lang="en-US" smtClean="0"/>
-              <a:t>6/23/20</a:t>
+              <a:t>6/24/20</a:t>
             </a:fld>
             <a:endParaRPr lang="en-US" dirty="0"/>
           </a:p>
@@ -5302,7 +5302,7 @@
           <a:p>
             <a:fld id="{669454CD-6DAB-7942-9B1D-8F3E2B882464}" type="datetime1">
               <a:rPr lang="en-US" smtClean="0"/>
-              <a:t>6/23/20</a:t>
+              <a:t>6/24/20</a:t>
             </a:fld>
             <a:endParaRPr lang="en-US" dirty="0"/>
           </a:p>
@@ -5686,7 +5686,7 @@
           <a:p>
             <a:fld id="{BD2CAD36-D42B-D445-A707-AA59905C7768}" type="datetime1">
               <a:rPr lang="en-US" smtClean="0"/>
-              <a:t>6/23/20</a:t>
+              <a:t>6/24/20</a:t>
             </a:fld>
             <a:endParaRPr lang="en-US" dirty="0"/>
           </a:p>
@@ -6068,7 +6068,7 @@
           <a:p>
             <a:fld id="{2D1D63B8-BB32-E649-92D4-94351543394C}" type="datetime1">
               <a:rPr lang="en-US" smtClean="0"/>
-              <a:t>6/23/20</a:t>
+              <a:t>6/24/20</a:t>
             </a:fld>
             <a:endParaRPr lang="en-US" dirty="0"/>
           </a:p>
@@ -6354,7 +6354,7 @@
           <a:p>
             <a:fld id="{FD02AE22-A9EA-FE42-BAB8-AD1D7606FF2E}" type="datetime1">
               <a:rPr lang="en-US" smtClean="0"/>
-              <a:t>6/23/20</a:t>
+              <a:t>6/24/20</a:t>
             </a:fld>
             <a:endParaRPr lang="en-US" dirty="0"/>
           </a:p>
@@ -7044,7 +7044,7 @@
           <a:p>
             <a:fld id="{307A731C-B4EF-644F-8FDB-2EBA3EC9415A}" type="datetime1">
               <a:rPr lang="en-US" smtClean="0"/>
-              <a:t>6/23/20</a:t>
+              <a:t>6/24/20</a:t>
             </a:fld>
             <a:endParaRPr lang="en-GB"/>
           </a:p>
@@ -7489,7 +7489,7 @@
             </a:br>
             <a:r>
               <a:rPr lang="en-US" sz="4400" dirty="0"/>
-              <a:t>NTUA7</a:t>
+              <a:t>NTUA</a:t>
             </a:r>
             <a:br>
               <a:rPr lang="en-US" sz="4400" dirty="0"/>
@@ -7744,18 +7744,90 @@
           <a:p>
             <a:fld id="{D52D66B2-0E0A-F441-A1DA-8039F615D612}" type="datetime1">
               <a:rPr lang="en-US" smtClean="0"/>
-              <a:t>6/23/20</a:t>
+              <a:t>6/24/20</a:t>
             </a:fld>
             <a:endParaRPr lang="en-US" dirty="0"/>
           </a:p>
         </p:txBody>
       </p:sp>
+      <p:sp>
+        <p:nvSpPr>
+          <p:cNvPr id="9" name="TextBox 8">
+            <a:extLst>
+              <a:ext uri="{FF2B5EF4-FFF2-40B4-BE49-F238E27FC236}">
+                <a16:creationId xmlns:a16="http://schemas.microsoft.com/office/drawing/2014/main" id="{94FFA463-5195-C64B-93B0-3FE5A4564439}"/>
+              </a:ext>
+            </a:extLst>
+          </p:cNvPr>
+          <p:cNvSpPr txBox="1"/>
+          <p:nvPr/>
+        </p:nvSpPr>
+        <p:spPr>
+          <a:xfrm>
+            <a:off x="2000250" y="628817"/>
+            <a:ext cx="2857500" cy="369332"/>
+          </a:xfrm>
+          <a:prstGeom prst="rect">
+            <a:avLst/>
+          </a:prstGeom>
+          <a:noFill/>
+        </p:spPr>
+        <p:txBody>
+          <a:bodyPr wrap="square" rtlCol="0">
+            <a:spAutoFit/>
+          </a:bodyPr>
+          <a:lstStyle/>
+          <a:p>
+            <a:pPr algn="ctr"/>
+            <a:r>
+              <a:rPr lang="en-GR" dirty="0"/>
+              <a:t>Leading</a:t>
+            </a:r>
+          </a:p>
+        </p:txBody>
+      </p:sp>
+      <p:sp>
+        <p:nvSpPr>
+          <p:cNvPr id="13" name="TextBox 12">
+            <a:extLst>
+              <a:ext uri="{FF2B5EF4-FFF2-40B4-BE49-F238E27FC236}">
+                <a16:creationId xmlns:a16="http://schemas.microsoft.com/office/drawing/2014/main" id="{4F969F21-FFD1-6241-84B2-629B9A342DED}"/>
+              </a:ext>
+            </a:extLst>
+          </p:cNvPr>
+          <p:cNvSpPr txBox="1"/>
+          <p:nvPr/>
+        </p:nvSpPr>
+        <p:spPr>
+          <a:xfrm>
+            <a:off x="7853362" y="628817"/>
+            <a:ext cx="2857500" cy="369332"/>
+          </a:xfrm>
+          <a:prstGeom prst="rect">
+            <a:avLst/>
+          </a:prstGeom>
+          <a:noFill/>
+        </p:spPr>
+        <p:txBody>
+          <a:bodyPr wrap="square" rtlCol="0">
+            <a:spAutoFit/>
+          </a:bodyPr>
+          <a:lstStyle/>
+          <a:p>
+            <a:pPr algn="ctr"/>
+            <a:r>
+              <a:rPr lang="en-GR" dirty="0"/>
+              <a:t>Sub-Leading</a:t>
+            </a:r>
+          </a:p>
+        </p:txBody>
+      </p:sp>
       <p:pic>
         <p:nvPicPr>
-          <p:cNvPr id="6" name="Picture 5">
+          <p:cNvPr id="4" name="Picture 3">
             <a:extLst>
               <a:ext uri="{FF2B5EF4-FFF2-40B4-BE49-F238E27FC236}">
-                <a16:creationId xmlns:a16="http://schemas.microsoft.com/office/drawing/2014/main" id="{D6B86FF5-E9C9-1C46-8DF1-F496611A94C0}"/>
+                <a16:creationId xmlns:a16="http://schemas.microsoft.com/office/drawing/2014/main" id="{582B3A9B-D006-634E-AB02-77AB93CF4AB8}"/>
               </a:ext>
             </a:extLst>
           </p:cNvPr>
@@ -7772,7 +7844,7 @@
         </p:blipFill>
         <p:spPr>
           <a:xfrm rot="5400000">
-            <a:off x="832739" y="440626"/>
+            <a:off x="875603" y="440626"/>
             <a:ext cx="4311269" cy="5976747"/>
           </a:xfrm>
           <a:prstGeom prst="rect">
@@ -7780,84 +7852,12 @@
           </a:prstGeom>
         </p:spPr>
       </p:pic>
-      <p:sp>
-        <p:nvSpPr>
-          <p:cNvPr id="9" name="TextBox 8">
+      <p:pic>
+        <p:nvPicPr>
+          <p:cNvPr id="10" name="Picture 9">
             <a:extLst>
               <a:ext uri="{FF2B5EF4-FFF2-40B4-BE49-F238E27FC236}">
-                <a16:creationId xmlns:a16="http://schemas.microsoft.com/office/drawing/2014/main" id="{94FFA463-5195-C64B-93B0-3FE5A4564439}"/>
-              </a:ext>
-            </a:extLst>
-          </p:cNvPr>
-          <p:cNvSpPr txBox="1"/>
-          <p:nvPr/>
-        </p:nvSpPr>
-        <p:spPr>
-          <a:xfrm>
-            <a:off x="2000250" y="628817"/>
-            <a:ext cx="2857500" cy="369332"/>
-          </a:xfrm>
-          <a:prstGeom prst="rect">
-            <a:avLst/>
-          </a:prstGeom>
-          <a:noFill/>
-        </p:spPr>
-        <p:txBody>
-          <a:bodyPr wrap="square" rtlCol="0">
-            <a:spAutoFit/>
-          </a:bodyPr>
-          <a:lstStyle/>
-          <a:p>
-            <a:pPr algn="ctr"/>
-            <a:r>
-              <a:rPr lang="en-GR" dirty="0"/>
-              <a:t>Leading</a:t>
-            </a:r>
-          </a:p>
-        </p:txBody>
-      </p:sp>
-      <p:sp>
-        <p:nvSpPr>
-          <p:cNvPr id="13" name="TextBox 12">
-            <a:extLst>
-              <a:ext uri="{FF2B5EF4-FFF2-40B4-BE49-F238E27FC236}">
-                <a16:creationId xmlns:a16="http://schemas.microsoft.com/office/drawing/2014/main" id="{4F969F21-FFD1-6241-84B2-629B9A342DED}"/>
-              </a:ext>
-            </a:extLst>
-          </p:cNvPr>
-          <p:cNvSpPr txBox="1"/>
-          <p:nvPr/>
-        </p:nvSpPr>
-        <p:spPr>
-          <a:xfrm>
-            <a:off x="7853362" y="628817"/>
-            <a:ext cx="2857500" cy="369332"/>
-          </a:xfrm>
-          <a:prstGeom prst="rect">
-            <a:avLst/>
-          </a:prstGeom>
-          <a:noFill/>
-        </p:spPr>
-        <p:txBody>
-          <a:bodyPr wrap="square" rtlCol="0">
-            <a:spAutoFit/>
-          </a:bodyPr>
-          <a:lstStyle/>
-          <a:p>
-            <a:pPr algn="ctr"/>
-            <a:r>
-              <a:rPr lang="en-GR" dirty="0"/>
-              <a:t>Sub-Leading</a:t>
-            </a:r>
-          </a:p>
-        </p:txBody>
-      </p:sp>
-      <p:pic>
-        <p:nvPicPr>
-          <p:cNvPr id="14" name="Picture 13">
-            <a:extLst>
-              <a:ext uri="{FF2B5EF4-FFF2-40B4-BE49-F238E27FC236}">
-                <a16:creationId xmlns:a16="http://schemas.microsoft.com/office/drawing/2014/main" id="{42D8942C-899A-1948-8C04-BAB071467AC5}"/>
+                <a16:creationId xmlns:a16="http://schemas.microsoft.com/office/drawing/2014/main" id="{7E9930B8-F79B-754D-9D39-0387E9F21A42}"/>
               </a:ext>
             </a:extLst>
           </p:cNvPr>
@@ -7874,7 +7874,7 @@
         </p:blipFill>
         <p:spPr>
           <a:xfrm rot="5400000">
-            <a:off x="6809486" y="440626"/>
+            <a:off x="6883107" y="440625"/>
             <a:ext cx="4311269" cy="5976747"/>
           </a:xfrm>
           <a:prstGeom prst="rect">
@@ -8021,7 +8021,7 @@
           <a:p>
             <a:fld id="{D52D66B2-0E0A-F441-A1DA-8039F615D612}" type="datetime1">
               <a:rPr lang="en-US" smtClean="0"/>
-              <a:t>6/23/20</a:t>
+              <a:t>6/24/20</a:t>
             </a:fld>
             <a:endParaRPr lang="en-US" dirty="0"/>
           </a:p>
@@ -8029,10 +8029,10 @@
       </p:sp>
       <p:pic>
         <p:nvPicPr>
-          <p:cNvPr id="4" name="Picture 3">
+          <p:cNvPr id="9" name="Picture 8">
             <a:extLst>
               <a:ext uri="{FF2B5EF4-FFF2-40B4-BE49-F238E27FC236}">
-                <a16:creationId xmlns:a16="http://schemas.microsoft.com/office/drawing/2014/main" id="{A3F326B0-8B58-3E47-B4B4-96DC90BC7E0F}"/>
+                <a16:creationId xmlns:a16="http://schemas.microsoft.com/office/drawing/2014/main" id="{6F65F29D-517C-6B49-865A-0703D0A2781E}"/>
               </a:ext>
             </a:extLst>
           </p:cNvPr>
@@ -8049,8 +8049,8 @@
         </p:blipFill>
         <p:spPr>
           <a:xfrm rot="5400000">
-            <a:off x="8394111" y="1340739"/>
-            <a:ext cx="3012694" cy="4176522"/>
+            <a:off x="591947" y="1304734"/>
+            <a:ext cx="3064637" cy="4248531"/>
           </a:xfrm>
           <a:prstGeom prst="rect">
             <a:avLst/>
@@ -8059,10 +8059,10 @@
       </p:pic>
       <p:pic>
         <p:nvPicPr>
-          <p:cNvPr id="8" name="Picture 7">
+          <p:cNvPr id="11" name="Picture 10">
             <a:extLst>
               <a:ext uri="{FF2B5EF4-FFF2-40B4-BE49-F238E27FC236}">
-                <a16:creationId xmlns:a16="http://schemas.microsoft.com/office/drawing/2014/main" id="{898A0C45-2259-064B-B87D-F3D0543B1F9E}"/>
+                <a16:creationId xmlns:a16="http://schemas.microsoft.com/office/drawing/2014/main" id="{8D06F68D-8F6E-1946-8BA9-084278FE9C7A}"/>
               </a:ext>
             </a:extLst>
           </p:cNvPr>
@@ -8079,8 +8079,8 @@
         </p:blipFill>
         <p:spPr>
           <a:xfrm rot="5400000">
-            <a:off x="4420872" y="1340739"/>
-            <a:ext cx="3012694" cy="4176522"/>
+            <a:off x="4520138" y="1304733"/>
+            <a:ext cx="3064637" cy="4248531"/>
           </a:xfrm>
           <a:prstGeom prst="rect">
             <a:avLst/>
@@ -8089,10 +8089,10 @@
       </p:pic>
       <p:pic>
         <p:nvPicPr>
-          <p:cNvPr id="10" name="Picture 9">
+          <p:cNvPr id="12" name="Picture 11">
             <a:extLst>
               <a:ext uri="{FF2B5EF4-FFF2-40B4-BE49-F238E27FC236}">
-                <a16:creationId xmlns:a16="http://schemas.microsoft.com/office/drawing/2014/main" id="{EF9A80AC-C184-C446-A860-7B7A97B72E83}"/>
+                <a16:creationId xmlns:a16="http://schemas.microsoft.com/office/drawing/2014/main" id="{36DBE473-F0A8-9440-ABCE-76ADA4FD5C63}"/>
               </a:ext>
             </a:extLst>
           </p:cNvPr>
@@ -8109,8 +8109,8 @@
         </p:blipFill>
         <p:spPr>
           <a:xfrm rot="5400000">
-            <a:off x="581914" y="1340739"/>
-            <a:ext cx="3012694" cy="4176522"/>
+            <a:off x="8448329" y="1304732"/>
+            <a:ext cx="3064637" cy="4248531"/>
           </a:xfrm>
           <a:prstGeom prst="rect">
             <a:avLst/>
@@ -8256,7 +8256,7 @@
           <a:p>
             <a:fld id="{D52D66B2-0E0A-F441-A1DA-8039F615D612}" type="datetime1">
               <a:rPr lang="en-US" smtClean="0"/>
-              <a:t>6/23/20</a:t>
+              <a:t>6/24/20</a:t>
             </a:fld>
             <a:endParaRPr lang="en-US" dirty="0"/>
           </a:p>
@@ -8264,10 +8264,10 @@
       </p:sp>
       <p:pic>
         <p:nvPicPr>
-          <p:cNvPr id="6" name="Picture 5">
+          <p:cNvPr id="4" name="Picture 3">
             <a:extLst>
               <a:ext uri="{FF2B5EF4-FFF2-40B4-BE49-F238E27FC236}">
-                <a16:creationId xmlns:a16="http://schemas.microsoft.com/office/drawing/2014/main" id="{051BFE90-AA46-DE40-BFC5-479AC2B343AD}"/>
+                <a16:creationId xmlns:a16="http://schemas.microsoft.com/office/drawing/2014/main" id="{D3F9C0B8-7470-E149-AFF6-5EDEE0437A4D}"/>
               </a:ext>
             </a:extLst>
           </p:cNvPr>
@@ -8284,8 +8284,8 @@
         </p:blipFill>
         <p:spPr>
           <a:xfrm rot="5400000">
-            <a:off x="581914" y="1340739"/>
-            <a:ext cx="3012694" cy="4176522"/>
+            <a:off x="591947" y="1304734"/>
+            <a:ext cx="3064637" cy="4248531"/>
           </a:xfrm>
           <a:prstGeom prst="rect">
             <a:avLst/>
@@ -8294,10 +8294,10 @@
       </p:pic>
       <p:pic>
         <p:nvPicPr>
-          <p:cNvPr id="11" name="Picture 10">
+          <p:cNvPr id="9" name="Picture 8">
             <a:extLst>
               <a:ext uri="{FF2B5EF4-FFF2-40B4-BE49-F238E27FC236}">
-                <a16:creationId xmlns:a16="http://schemas.microsoft.com/office/drawing/2014/main" id="{1D3AF17F-5EFB-BD41-8315-6215DD16FE47}"/>
+                <a16:creationId xmlns:a16="http://schemas.microsoft.com/office/drawing/2014/main" id="{AB45C8BC-5A5C-3C4B-B271-BA86DBB02206}"/>
               </a:ext>
             </a:extLst>
           </p:cNvPr>
@@ -8314,8 +8314,8 @@
         </p:blipFill>
         <p:spPr>
           <a:xfrm rot="5400000">
-            <a:off x="4488958" y="1340739"/>
-            <a:ext cx="3012694" cy="4176522"/>
+            <a:off x="4520138" y="1304732"/>
+            <a:ext cx="3064637" cy="4248531"/>
           </a:xfrm>
           <a:prstGeom prst="rect">
             <a:avLst/>
@@ -8324,10 +8324,10 @@
       </p:pic>
       <p:pic>
         <p:nvPicPr>
-          <p:cNvPr id="13" name="Picture 12">
+          <p:cNvPr id="12" name="Picture 11">
             <a:extLst>
               <a:ext uri="{FF2B5EF4-FFF2-40B4-BE49-F238E27FC236}">
-                <a16:creationId xmlns:a16="http://schemas.microsoft.com/office/drawing/2014/main" id="{1D105E51-4B83-834F-934D-F5510831294D}"/>
+                <a16:creationId xmlns:a16="http://schemas.microsoft.com/office/drawing/2014/main" id="{48064984-BC73-8A44-93AD-BF1CFDD55664}"/>
               </a:ext>
             </a:extLst>
           </p:cNvPr>
@@ -8344,8 +8344,8 @@
         </p:blipFill>
         <p:spPr>
           <a:xfrm rot="5400000">
-            <a:off x="8394111" y="1340739"/>
-            <a:ext cx="3012694" cy="4176522"/>
+            <a:off x="8535418" y="1304732"/>
+            <a:ext cx="3064637" cy="4248531"/>
           </a:xfrm>
           <a:prstGeom prst="rect">
             <a:avLst/>
@@ -8491,7 +8491,7 @@
           <a:p>
             <a:fld id="{D52D66B2-0E0A-F441-A1DA-8039F615D612}" type="datetime1">
               <a:rPr lang="en-US" smtClean="0"/>
-              <a:t>6/23/20</a:t>
+              <a:t>6/24/20</a:t>
             </a:fld>
             <a:endParaRPr lang="en-US" dirty="0"/>
           </a:p>
@@ -8499,10 +8499,10 @@
       </p:sp>
       <p:pic>
         <p:nvPicPr>
-          <p:cNvPr id="9" name="Picture 8">
+          <p:cNvPr id="10" name="Picture 9">
             <a:extLst>
               <a:ext uri="{FF2B5EF4-FFF2-40B4-BE49-F238E27FC236}">
-                <a16:creationId xmlns:a16="http://schemas.microsoft.com/office/drawing/2014/main" id="{526F83D4-E04D-0844-9F41-31AE1FED89D9}"/>
+                <a16:creationId xmlns:a16="http://schemas.microsoft.com/office/drawing/2014/main" id="{923697A3-F083-294D-866C-170A5A78E24B}"/>
               </a:ext>
             </a:extLst>
           </p:cNvPr>
@@ -8519,8 +8519,8 @@
         </p:blipFill>
         <p:spPr>
           <a:xfrm rot="5400000">
-            <a:off x="2721541" y="2771248"/>
-            <a:ext cx="3012694" cy="4176522"/>
+            <a:off x="2439416" y="2803201"/>
+            <a:ext cx="3064637" cy="4248531"/>
           </a:xfrm>
           <a:prstGeom prst="rect">
             <a:avLst/>
@@ -8529,10 +8529,10 @@
       </p:pic>
       <p:pic>
         <p:nvPicPr>
-          <p:cNvPr id="15" name="Picture 14">
+          <p:cNvPr id="16" name="Picture 15">
             <a:extLst>
               <a:ext uri="{FF2B5EF4-FFF2-40B4-BE49-F238E27FC236}">
-                <a16:creationId xmlns:a16="http://schemas.microsoft.com/office/drawing/2014/main" id="{6FF508F4-5EAE-8540-A944-128FA1C96663}"/>
+                <a16:creationId xmlns:a16="http://schemas.microsoft.com/office/drawing/2014/main" id="{EF59CF86-D3BE-A241-8535-71B12D6E1BEC}"/>
               </a:ext>
             </a:extLst>
           </p:cNvPr>
@@ -8549,8 +8549,8 @@
         </p:blipFill>
         <p:spPr>
           <a:xfrm rot="5400000">
-            <a:off x="6898063" y="2771248"/>
-            <a:ext cx="3012694" cy="4176522"/>
+            <a:off x="6899886" y="2803201"/>
+            <a:ext cx="3064637" cy="4248531"/>
           </a:xfrm>
           <a:prstGeom prst="rect">
             <a:avLst/>
@@ -8559,10 +8559,10 @@
       </p:pic>
       <p:pic>
         <p:nvPicPr>
-          <p:cNvPr id="4" name="Picture 3">
+          <p:cNvPr id="6" name="Picture 5">
             <a:extLst>
               <a:ext uri="{FF2B5EF4-FFF2-40B4-BE49-F238E27FC236}">
-                <a16:creationId xmlns:a16="http://schemas.microsoft.com/office/drawing/2014/main" id="{447C468E-18C1-A544-AD32-E678D83F4036}"/>
+                <a16:creationId xmlns:a16="http://schemas.microsoft.com/office/drawing/2014/main" id="{021DE30B-672A-5D41-9BAD-0CD1325C5A9C}"/>
               </a:ext>
             </a:extLst>
           </p:cNvPr>
@@ -8579,8 +8579,8 @@
         </p:blipFill>
         <p:spPr>
           <a:xfrm rot="5400000">
-            <a:off x="2721541" y="-86561"/>
-            <a:ext cx="3012694" cy="4176522"/>
+            <a:off x="2439416" y="-35637"/>
+            <a:ext cx="3064637" cy="4248531"/>
           </a:xfrm>
           <a:prstGeom prst="rect">
             <a:avLst/>
@@ -8589,10 +8589,10 @@
       </p:pic>
       <p:pic>
         <p:nvPicPr>
-          <p:cNvPr id="12" name="Picture 11">
+          <p:cNvPr id="13" name="Picture 12">
             <a:extLst>
               <a:ext uri="{FF2B5EF4-FFF2-40B4-BE49-F238E27FC236}">
-                <a16:creationId xmlns:a16="http://schemas.microsoft.com/office/drawing/2014/main" id="{BC3EE728-9926-134E-BC45-A32A70AC1E59}"/>
+                <a16:creationId xmlns:a16="http://schemas.microsoft.com/office/drawing/2014/main" id="{C7A2314D-6EE8-6445-8476-96312D1F8785}"/>
               </a:ext>
             </a:extLst>
           </p:cNvPr>
@@ -8609,8 +8609,8 @@
         </p:blipFill>
         <p:spPr>
           <a:xfrm rot="5400000">
-            <a:off x="6898063" y="-78145"/>
-            <a:ext cx="3012694" cy="4176522"/>
+            <a:off x="6899886" y="-35637"/>
+            <a:ext cx="3064637" cy="4248531"/>
           </a:xfrm>
           <a:prstGeom prst="rect">
             <a:avLst/>
@@ -8764,7 +8764,7 @@
           <a:p>
             <a:fld id="{D52D66B2-0E0A-F441-A1DA-8039F615D612}" type="datetime1">
               <a:rPr lang="en-US" smtClean="0"/>
-              <a:t>6/23/20</a:t>
+              <a:t>6/24/20</a:t>
             </a:fld>
             <a:endParaRPr lang="en-US" dirty="0"/>
           </a:p>
@@ -8772,10 +8772,10 @@
       </p:sp>
       <p:pic>
         <p:nvPicPr>
-          <p:cNvPr id="6" name="Picture 5">
+          <p:cNvPr id="4" name="Picture 3">
             <a:extLst>
               <a:ext uri="{FF2B5EF4-FFF2-40B4-BE49-F238E27FC236}">
-                <a16:creationId xmlns:a16="http://schemas.microsoft.com/office/drawing/2014/main" id="{1E14580A-0835-C143-84F7-B0068ECD848A}"/>
+                <a16:creationId xmlns:a16="http://schemas.microsoft.com/office/drawing/2014/main" id="{2F249102-D1F8-4744-B191-B6BD43E7628E}"/>
               </a:ext>
             </a:extLst>
           </p:cNvPr>
@@ -8792,8 +8792,8 @@
         </p:blipFill>
         <p:spPr>
           <a:xfrm rot="5400000">
-            <a:off x="8394111" y="1340739"/>
-            <a:ext cx="3012694" cy="4176522"/>
+            <a:off x="591947" y="1304734"/>
+            <a:ext cx="3064637" cy="4248531"/>
           </a:xfrm>
           <a:prstGeom prst="rect">
             <a:avLst/>
@@ -8802,10 +8802,10 @@
       </p:pic>
       <p:pic>
         <p:nvPicPr>
-          <p:cNvPr id="11" name="Picture 10">
+          <p:cNvPr id="9" name="Picture 8">
             <a:extLst>
               <a:ext uri="{FF2B5EF4-FFF2-40B4-BE49-F238E27FC236}">
-                <a16:creationId xmlns:a16="http://schemas.microsoft.com/office/drawing/2014/main" id="{5F8CD6D5-F524-D44E-895C-2ADA1B4E6067}"/>
+                <a16:creationId xmlns:a16="http://schemas.microsoft.com/office/drawing/2014/main" id="{B6E35174-5AE9-2646-AB3B-3AC400E41164}"/>
               </a:ext>
             </a:extLst>
           </p:cNvPr>
@@ -8822,8 +8822,8 @@
         </p:blipFill>
         <p:spPr>
           <a:xfrm rot="5400000">
-            <a:off x="4420872" y="1340739"/>
-            <a:ext cx="3012694" cy="4176522"/>
+            <a:off x="4520138" y="1304733"/>
+            <a:ext cx="3064637" cy="4248531"/>
           </a:xfrm>
           <a:prstGeom prst="rect">
             <a:avLst/>
@@ -8832,10 +8832,10 @@
       </p:pic>
       <p:pic>
         <p:nvPicPr>
-          <p:cNvPr id="13" name="Picture 12">
+          <p:cNvPr id="12" name="Picture 11">
             <a:extLst>
               <a:ext uri="{FF2B5EF4-FFF2-40B4-BE49-F238E27FC236}">
-                <a16:creationId xmlns:a16="http://schemas.microsoft.com/office/drawing/2014/main" id="{C4B3E9C4-380D-9549-8917-8A53D9EB0B6B}"/>
+                <a16:creationId xmlns:a16="http://schemas.microsoft.com/office/drawing/2014/main" id="{9BD305D7-D446-1F4B-9DA9-0043C00048C5}"/>
               </a:ext>
             </a:extLst>
           </p:cNvPr>
@@ -8852,8 +8852,8 @@
         </p:blipFill>
         <p:spPr>
           <a:xfrm rot="5400000">
-            <a:off x="581914" y="1340739"/>
-            <a:ext cx="3012694" cy="4176522"/>
+            <a:off x="8535418" y="1304732"/>
+            <a:ext cx="3064637" cy="4248531"/>
           </a:xfrm>
           <a:prstGeom prst="rect">
             <a:avLst/>
@@ -9007,7 +9007,7 @@
           <a:p>
             <a:fld id="{D52D66B2-0E0A-F441-A1DA-8039F615D612}" type="datetime1">
               <a:rPr lang="en-US" smtClean="0"/>
-              <a:t>6/23/20</a:t>
+              <a:t>6/24/20</a:t>
             </a:fld>
             <a:endParaRPr lang="en-US" dirty="0"/>
           </a:p>
@@ -9015,10 +9015,10 @@
       </p:sp>
       <p:pic>
         <p:nvPicPr>
-          <p:cNvPr id="4" name="Picture 3">
+          <p:cNvPr id="6" name="Picture 5">
             <a:extLst>
               <a:ext uri="{FF2B5EF4-FFF2-40B4-BE49-F238E27FC236}">
-                <a16:creationId xmlns:a16="http://schemas.microsoft.com/office/drawing/2014/main" id="{2A764306-AAAA-CE40-A7A9-DC1F8C81BB0F}"/>
+                <a16:creationId xmlns:a16="http://schemas.microsoft.com/office/drawing/2014/main" id="{50991DBF-3574-5C44-ACAE-59CA2439F8DA}"/>
               </a:ext>
             </a:extLst>
           </p:cNvPr>
@@ -9035,8 +9035,8 @@
         </p:blipFill>
         <p:spPr>
           <a:xfrm rot="5400000">
-            <a:off x="581914" y="1340739"/>
-            <a:ext cx="3012694" cy="4176522"/>
+            <a:off x="591947" y="1304734"/>
+            <a:ext cx="3064637" cy="4248531"/>
           </a:xfrm>
           <a:prstGeom prst="rect">
             <a:avLst/>
@@ -9045,10 +9045,10 @@
       </p:pic>
       <p:pic>
         <p:nvPicPr>
-          <p:cNvPr id="9" name="Picture 8">
+          <p:cNvPr id="10" name="Picture 9">
             <a:extLst>
               <a:ext uri="{FF2B5EF4-FFF2-40B4-BE49-F238E27FC236}">
-                <a16:creationId xmlns:a16="http://schemas.microsoft.com/office/drawing/2014/main" id="{5A52D969-C3AF-B34B-BAA6-AC51B7AD31C1}"/>
+                <a16:creationId xmlns:a16="http://schemas.microsoft.com/office/drawing/2014/main" id="{83C51C50-C4B4-9445-B75D-F901B1F01A86}"/>
               </a:ext>
             </a:extLst>
           </p:cNvPr>
@@ -9065,8 +9065,8 @@
         </p:blipFill>
         <p:spPr>
           <a:xfrm rot="5400000">
-            <a:off x="4569522" y="1340739"/>
-            <a:ext cx="3012694" cy="4176522"/>
+            <a:off x="4563681" y="1304733"/>
+            <a:ext cx="3064637" cy="4248531"/>
           </a:xfrm>
           <a:prstGeom prst="rect">
             <a:avLst/>
@@ -9075,10 +9075,10 @@
       </p:pic>
       <p:pic>
         <p:nvPicPr>
-          <p:cNvPr id="12" name="Picture 11">
+          <p:cNvPr id="13" name="Picture 12">
             <a:extLst>
               <a:ext uri="{FF2B5EF4-FFF2-40B4-BE49-F238E27FC236}">
-                <a16:creationId xmlns:a16="http://schemas.microsoft.com/office/drawing/2014/main" id="{0127E2AA-CAE8-2D41-9E60-395BA0262966}"/>
+                <a16:creationId xmlns:a16="http://schemas.microsoft.com/office/drawing/2014/main" id="{F2EF255E-C7C5-F143-B1D9-8D05727D10C4}"/>
               </a:ext>
             </a:extLst>
           </p:cNvPr>
@@ -9095,8 +9095,8 @@
         </p:blipFill>
         <p:spPr>
           <a:xfrm rot="5400000">
-            <a:off x="8510306" y="1340739"/>
-            <a:ext cx="3012694" cy="4176522"/>
+            <a:off x="8533275" y="1304733"/>
+            <a:ext cx="3064637" cy="4248531"/>
           </a:xfrm>
           <a:prstGeom prst="rect">
             <a:avLst/>
@@ -9250,7 +9250,7 @@
           <a:p>
             <a:fld id="{D52D66B2-0E0A-F441-A1DA-8039F615D612}" type="datetime1">
               <a:rPr lang="en-US" smtClean="0"/>
-              <a:t>6/23/20</a:t>
+              <a:t>6/24/20</a:t>
             </a:fld>
             <a:endParaRPr lang="en-US" dirty="0"/>
           </a:p>
@@ -9258,10 +9258,10 @@
       </p:sp>
       <p:pic>
         <p:nvPicPr>
-          <p:cNvPr id="10" name="Picture 9">
+          <p:cNvPr id="9" name="Picture 8">
             <a:extLst>
               <a:ext uri="{FF2B5EF4-FFF2-40B4-BE49-F238E27FC236}">
-                <a16:creationId xmlns:a16="http://schemas.microsoft.com/office/drawing/2014/main" id="{4E96CDD1-8043-DB46-8920-3B14E6A6F8D5}"/>
+                <a16:creationId xmlns:a16="http://schemas.microsoft.com/office/drawing/2014/main" id="{E4C923EB-1B2F-BB45-970B-639061DE12E7}"/>
               </a:ext>
             </a:extLst>
           </p:cNvPr>
@@ -9278,8 +9278,8 @@
         </p:blipFill>
         <p:spPr>
           <a:xfrm rot="5400000">
-            <a:off x="2501392" y="2847086"/>
-            <a:ext cx="3012694" cy="4176522"/>
+            <a:off x="2439416" y="2837053"/>
+            <a:ext cx="3064637" cy="4248531"/>
           </a:xfrm>
           <a:prstGeom prst="rect">
             <a:avLst/>
@@ -9288,10 +9288,10 @@
       </p:pic>
       <p:pic>
         <p:nvPicPr>
-          <p:cNvPr id="16" name="Picture 15">
+          <p:cNvPr id="15" name="Picture 14">
             <a:extLst>
               <a:ext uri="{FF2B5EF4-FFF2-40B4-BE49-F238E27FC236}">
-                <a16:creationId xmlns:a16="http://schemas.microsoft.com/office/drawing/2014/main" id="{781D0FAE-1A73-4B4A-B543-EC5321080977}"/>
+                <a16:creationId xmlns:a16="http://schemas.microsoft.com/office/drawing/2014/main" id="{90E65DE7-4533-6B45-A5F8-EA0314473D15}"/>
               </a:ext>
             </a:extLst>
           </p:cNvPr>
@@ -9308,8 +9308,8 @@
         </p:blipFill>
         <p:spPr>
           <a:xfrm rot="5400000">
-            <a:off x="6677914" y="2845952"/>
-            <a:ext cx="3012694" cy="4176522"/>
+            <a:off x="6976669" y="2837053"/>
+            <a:ext cx="3064637" cy="4248531"/>
           </a:xfrm>
           <a:prstGeom prst="rect">
             <a:avLst/>
@@ -9318,10 +9318,10 @@
       </p:pic>
       <p:pic>
         <p:nvPicPr>
-          <p:cNvPr id="6" name="Picture 5">
+          <p:cNvPr id="4" name="Picture 3">
             <a:extLst>
               <a:ext uri="{FF2B5EF4-FFF2-40B4-BE49-F238E27FC236}">
-                <a16:creationId xmlns:a16="http://schemas.microsoft.com/office/drawing/2014/main" id="{8AB24F23-CE91-8342-8BA1-9EBF8F324ABF}"/>
+                <a16:creationId xmlns:a16="http://schemas.microsoft.com/office/drawing/2014/main" id="{415139F7-1573-5A4F-AC2E-4643DCF7BEB0}"/>
               </a:ext>
             </a:extLst>
           </p:cNvPr>
@@ -9338,8 +9338,8 @@
         </p:blipFill>
         <p:spPr>
           <a:xfrm rot="5400000">
-            <a:off x="2501392" y="-24471"/>
-            <a:ext cx="3012694" cy="4176522"/>
+            <a:off x="2520757" y="-34637"/>
+            <a:ext cx="3064637" cy="4248531"/>
           </a:xfrm>
           <a:prstGeom prst="rect">
             <a:avLst/>
@@ -9348,10 +9348,10 @@
       </p:pic>
       <p:pic>
         <p:nvPicPr>
-          <p:cNvPr id="13" name="Picture 12">
+          <p:cNvPr id="12" name="Picture 11">
             <a:extLst>
               <a:ext uri="{FF2B5EF4-FFF2-40B4-BE49-F238E27FC236}">
-                <a16:creationId xmlns:a16="http://schemas.microsoft.com/office/drawing/2014/main" id="{FEF2C4DC-CB44-FD4F-A7AB-F4BC3EF1BAD7}"/>
+                <a16:creationId xmlns:a16="http://schemas.microsoft.com/office/drawing/2014/main" id="{CE2398AA-824E-B541-A67E-C3D74B5189E4}"/>
               </a:ext>
             </a:extLst>
           </p:cNvPr>
@@ -9368,8 +9368,8 @@
         </p:blipFill>
         <p:spPr>
           <a:xfrm rot="5400000">
-            <a:off x="6634371" y="-6380"/>
-            <a:ext cx="3012694" cy="4176522"/>
+            <a:off x="6976670" y="-34637"/>
+            <a:ext cx="3064637" cy="4248531"/>
           </a:xfrm>
           <a:prstGeom prst="rect">
             <a:avLst/>
@@ -9523,18 +9523,90 @@
           <a:p>
             <a:fld id="{D52D66B2-0E0A-F441-A1DA-8039F615D612}" type="datetime1">
               <a:rPr lang="en-US" smtClean="0"/>
-              <a:t>6/23/20</a:t>
+              <a:t>6/24/20</a:t>
             </a:fld>
             <a:endParaRPr lang="en-US" dirty="0"/>
           </a:p>
         </p:txBody>
       </p:sp>
+      <p:sp>
+        <p:nvSpPr>
+          <p:cNvPr id="10" name="TextBox 9">
+            <a:extLst>
+              <a:ext uri="{FF2B5EF4-FFF2-40B4-BE49-F238E27FC236}">
+                <a16:creationId xmlns:a16="http://schemas.microsoft.com/office/drawing/2014/main" id="{BFA8A760-B4E2-4447-8057-6F7FE5AC7053}"/>
+              </a:ext>
+            </a:extLst>
+          </p:cNvPr>
+          <p:cNvSpPr txBox="1"/>
+          <p:nvPr/>
+        </p:nvSpPr>
+        <p:spPr>
+          <a:xfrm>
+            <a:off x="2000250" y="628817"/>
+            <a:ext cx="2857500" cy="369332"/>
+          </a:xfrm>
+          <a:prstGeom prst="rect">
+            <a:avLst/>
+          </a:prstGeom>
+          <a:noFill/>
+        </p:spPr>
+        <p:txBody>
+          <a:bodyPr wrap="square" rtlCol="0">
+            <a:spAutoFit/>
+          </a:bodyPr>
+          <a:lstStyle/>
+          <a:p>
+            <a:pPr algn="ctr"/>
+            <a:r>
+              <a:rPr lang="en-GR" dirty="0"/>
+              <a:t>Leading</a:t>
+            </a:r>
+          </a:p>
+        </p:txBody>
+      </p:sp>
+      <p:sp>
+        <p:nvSpPr>
+          <p:cNvPr id="11" name="TextBox 10">
+            <a:extLst>
+              <a:ext uri="{FF2B5EF4-FFF2-40B4-BE49-F238E27FC236}">
+                <a16:creationId xmlns:a16="http://schemas.microsoft.com/office/drawing/2014/main" id="{83C8C820-2264-2241-AF15-1A20E9685DC0}"/>
+              </a:ext>
+            </a:extLst>
+          </p:cNvPr>
+          <p:cNvSpPr txBox="1"/>
+          <p:nvPr/>
+        </p:nvSpPr>
+        <p:spPr>
+          <a:xfrm>
+            <a:off x="7853362" y="628817"/>
+            <a:ext cx="2857500" cy="369332"/>
+          </a:xfrm>
+          <a:prstGeom prst="rect">
+            <a:avLst/>
+          </a:prstGeom>
+          <a:noFill/>
+        </p:spPr>
+        <p:txBody>
+          <a:bodyPr wrap="square" rtlCol="0">
+            <a:spAutoFit/>
+          </a:bodyPr>
+          <a:lstStyle/>
+          <a:p>
+            <a:pPr algn="ctr"/>
+            <a:r>
+              <a:rPr lang="en-GR" dirty="0"/>
+              <a:t>Sub-Leading</a:t>
+            </a:r>
+          </a:p>
+        </p:txBody>
+      </p:sp>
       <p:pic>
         <p:nvPicPr>
-          <p:cNvPr id="4" name="Picture 3">
+          <p:cNvPr id="16" name="Picture 15">
             <a:extLst>
               <a:ext uri="{FF2B5EF4-FFF2-40B4-BE49-F238E27FC236}">
-                <a16:creationId xmlns:a16="http://schemas.microsoft.com/office/drawing/2014/main" id="{27BC2D44-2301-304A-9A64-9B9A72B891AB}"/>
+                <a16:creationId xmlns:a16="http://schemas.microsoft.com/office/drawing/2014/main" id="{7E892C52-1BC8-7247-B0E7-3B570A6CBA71}"/>
               </a:ext>
             </a:extLst>
           </p:cNvPr>
@@ -9551,7 +9623,7 @@
         </p:blipFill>
         <p:spPr>
           <a:xfrm rot="5400000">
-            <a:off x="832739" y="440626"/>
+            <a:off x="951992" y="440625"/>
             <a:ext cx="4311269" cy="5976747"/>
           </a:xfrm>
           <a:prstGeom prst="rect">
@@ -9561,10 +9633,10 @@
       </p:pic>
       <p:pic>
         <p:nvPicPr>
-          <p:cNvPr id="8" name="Picture 7">
+          <p:cNvPr id="18" name="Picture 17">
             <a:extLst>
               <a:ext uri="{FF2B5EF4-FFF2-40B4-BE49-F238E27FC236}">
-                <a16:creationId xmlns:a16="http://schemas.microsoft.com/office/drawing/2014/main" id="{9B17C3A7-9466-EC41-B665-33A8A2D0D947}"/>
+                <a16:creationId xmlns:a16="http://schemas.microsoft.com/office/drawing/2014/main" id="{DB2AAF44-A245-A44F-A6C3-680875F97619}"/>
               </a:ext>
             </a:extLst>
           </p:cNvPr>
@@ -9581,7 +9653,7 @@
         </p:blipFill>
         <p:spPr>
           <a:xfrm rot="5400000">
-            <a:off x="6809486" y="440625"/>
+            <a:off x="7010476" y="440625"/>
             <a:ext cx="4311269" cy="5976747"/>
           </a:xfrm>
           <a:prstGeom prst="rect">
@@ -9589,78 +9661,6 @@
           </a:prstGeom>
         </p:spPr>
       </p:pic>
-      <p:sp>
-        <p:nvSpPr>
-          <p:cNvPr id="10" name="TextBox 9">
-            <a:extLst>
-              <a:ext uri="{FF2B5EF4-FFF2-40B4-BE49-F238E27FC236}">
-                <a16:creationId xmlns:a16="http://schemas.microsoft.com/office/drawing/2014/main" id="{BFA8A760-B4E2-4447-8057-6F7FE5AC7053}"/>
-              </a:ext>
-            </a:extLst>
-          </p:cNvPr>
-          <p:cNvSpPr txBox="1"/>
-          <p:nvPr/>
-        </p:nvSpPr>
-        <p:spPr>
-          <a:xfrm>
-            <a:off x="2000250" y="628817"/>
-            <a:ext cx="2857500" cy="369332"/>
-          </a:xfrm>
-          <a:prstGeom prst="rect">
-            <a:avLst/>
-          </a:prstGeom>
-          <a:noFill/>
-        </p:spPr>
-        <p:txBody>
-          <a:bodyPr wrap="square" rtlCol="0">
-            <a:spAutoFit/>
-          </a:bodyPr>
-          <a:lstStyle/>
-          <a:p>
-            <a:pPr algn="ctr"/>
-            <a:r>
-              <a:rPr lang="en-GR" dirty="0"/>
-              <a:t>Leading</a:t>
-            </a:r>
-          </a:p>
-        </p:txBody>
-      </p:sp>
-      <p:sp>
-        <p:nvSpPr>
-          <p:cNvPr id="11" name="TextBox 10">
-            <a:extLst>
-              <a:ext uri="{FF2B5EF4-FFF2-40B4-BE49-F238E27FC236}">
-                <a16:creationId xmlns:a16="http://schemas.microsoft.com/office/drawing/2014/main" id="{83C8C820-2264-2241-AF15-1A20E9685DC0}"/>
-              </a:ext>
-            </a:extLst>
-          </p:cNvPr>
-          <p:cNvSpPr txBox="1"/>
-          <p:nvPr/>
-        </p:nvSpPr>
-        <p:spPr>
-          <a:xfrm>
-            <a:off x="7853362" y="628817"/>
-            <a:ext cx="2857500" cy="369332"/>
-          </a:xfrm>
-          <a:prstGeom prst="rect">
-            <a:avLst/>
-          </a:prstGeom>
-          <a:noFill/>
-        </p:spPr>
-        <p:txBody>
-          <a:bodyPr wrap="square" rtlCol="0">
-            <a:spAutoFit/>
-          </a:bodyPr>
-          <a:lstStyle/>
-          <a:p>
-            <a:pPr algn="ctr"/>
-            <a:r>
-              <a:rPr lang="en-GR" dirty="0"/>
-              <a:t>Sub-Leading</a:t>
-            </a:r>
-          </a:p>
-        </p:txBody>
-      </p:sp>
     </p:spTree>
     <p:extLst>
       <p:ext uri="{BB962C8B-B14F-4D97-AF65-F5344CB8AC3E}">
@@ -9800,7 +9800,7 @@
           <a:p>
             <a:fld id="{D52D66B2-0E0A-F441-A1DA-8039F615D612}" type="datetime1">
               <a:rPr lang="en-US" smtClean="0"/>
-              <a:t>6/23/20</a:t>
+              <a:t>6/24/20</a:t>
             </a:fld>
             <a:endParaRPr lang="en-US" dirty="0"/>
           </a:p>
@@ -9808,10 +9808,10 @@
       </p:sp>
       <p:pic>
         <p:nvPicPr>
-          <p:cNvPr id="6" name="Picture 5">
+          <p:cNvPr id="4" name="Picture 3">
             <a:extLst>
               <a:ext uri="{FF2B5EF4-FFF2-40B4-BE49-F238E27FC236}">
-                <a16:creationId xmlns:a16="http://schemas.microsoft.com/office/drawing/2014/main" id="{D3746641-E783-EF4F-A90E-31CD4A9C9A64}"/>
+                <a16:creationId xmlns:a16="http://schemas.microsoft.com/office/drawing/2014/main" id="{ADF1B5E4-665A-0548-BE3E-E42B2B7F3BD8}"/>
               </a:ext>
             </a:extLst>
           </p:cNvPr>
@@ -9828,8 +9828,8 @@
         </p:blipFill>
         <p:spPr>
           <a:xfrm rot="5400000">
-            <a:off x="8394111" y="1340739"/>
-            <a:ext cx="3012694" cy="4176522"/>
+            <a:off x="591947" y="1304734"/>
+            <a:ext cx="3064637" cy="4248531"/>
           </a:xfrm>
           <a:prstGeom prst="rect">
             <a:avLst/>
@@ -9838,10 +9838,10 @@
       </p:pic>
       <p:pic>
         <p:nvPicPr>
-          <p:cNvPr id="11" name="Picture 10">
+          <p:cNvPr id="9" name="Picture 8">
             <a:extLst>
               <a:ext uri="{FF2B5EF4-FFF2-40B4-BE49-F238E27FC236}">
-                <a16:creationId xmlns:a16="http://schemas.microsoft.com/office/drawing/2014/main" id="{BB6328FA-5D04-BC46-BF81-2310FBCF5589}"/>
+                <a16:creationId xmlns:a16="http://schemas.microsoft.com/office/drawing/2014/main" id="{FAB1E4B4-A2A9-BE4C-924D-6509F233F393}"/>
               </a:ext>
             </a:extLst>
           </p:cNvPr>
@@ -9858,8 +9858,8 @@
         </p:blipFill>
         <p:spPr>
           <a:xfrm rot="5400000">
-            <a:off x="4546110" y="1340739"/>
-            <a:ext cx="3012694" cy="4176522"/>
+            <a:off x="4520138" y="1304734"/>
+            <a:ext cx="3064637" cy="4248531"/>
           </a:xfrm>
           <a:prstGeom prst="rect">
             <a:avLst/>
@@ -9868,10 +9868,10 @@
       </p:pic>
       <p:pic>
         <p:nvPicPr>
-          <p:cNvPr id="13" name="Picture 12">
+          <p:cNvPr id="12" name="Picture 11">
             <a:extLst>
               <a:ext uri="{FF2B5EF4-FFF2-40B4-BE49-F238E27FC236}">
-                <a16:creationId xmlns:a16="http://schemas.microsoft.com/office/drawing/2014/main" id="{EA30E296-93E9-9644-83D3-D9A7F22CB2A2}"/>
+                <a16:creationId xmlns:a16="http://schemas.microsoft.com/office/drawing/2014/main" id="{E2F55981-2FDE-204B-A58E-B6D3A9BC0B47}"/>
               </a:ext>
             </a:extLst>
           </p:cNvPr>
@@ -9888,8 +9888,8 @@
         </p:blipFill>
         <p:spPr>
           <a:xfrm rot="5400000">
-            <a:off x="581914" y="1340739"/>
-            <a:ext cx="3012694" cy="4176522"/>
+            <a:off x="8535416" y="1304733"/>
+            <a:ext cx="3064637" cy="4248531"/>
           </a:xfrm>
           <a:prstGeom prst="rect">
             <a:avLst/>
@@ -10035,7 +10035,7 @@
           <a:p>
             <a:fld id="{D52D66B2-0E0A-F441-A1DA-8039F615D612}" type="datetime1">
               <a:rPr lang="en-US" smtClean="0"/>
-              <a:t>6/23/20</a:t>
+              <a:t>6/24/20</a:t>
             </a:fld>
             <a:endParaRPr lang="en-US" dirty="0"/>
           </a:p>
@@ -10043,10 +10043,10 @@
       </p:sp>
       <p:pic>
         <p:nvPicPr>
-          <p:cNvPr id="4" name="Picture 3">
+          <p:cNvPr id="6" name="Picture 5">
             <a:extLst>
               <a:ext uri="{FF2B5EF4-FFF2-40B4-BE49-F238E27FC236}">
-                <a16:creationId xmlns:a16="http://schemas.microsoft.com/office/drawing/2014/main" id="{355F1DF1-85E2-764B-AC5E-A7F630D8C978}"/>
+                <a16:creationId xmlns:a16="http://schemas.microsoft.com/office/drawing/2014/main" id="{D2DEF5D6-2395-4345-BFBB-E79F7218B505}"/>
               </a:ext>
             </a:extLst>
           </p:cNvPr>
@@ -10063,8 +10063,8 @@
         </p:blipFill>
         <p:spPr>
           <a:xfrm rot="5400000">
-            <a:off x="581914" y="1340739"/>
-            <a:ext cx="3012694" cy="4176522"/>
+            <a:off x="591947" y="1304734"/>
+            <a:ext cx="3064637" cy="4248531"/>
           </a:xfrm>
           <a:prstGeom prst="rect">
             <a:avLst/>
@@ -10073,10 +10073,10 @@
       </p:pic>
       <p:pic>
         <p:nvPicPr>
-          <p:cNvPr id="9" name="Picture 8">
+          <p:cNvPr id="10" name="Picture 9">
             <a:extLst>
               <a:ext uri="{FF2B5EF4-FFF2-40B4-BE49-F238E27FC236}">
-                <a16:creationId xmlns:a16="http://schemas.microsoft.com/office/drawing/2014/main" id="{644A45C4-C39D-2F45-8FAE-B514E20AF08B}"/>
+                <a16:creationId xmlns:a16="http://schemas.microsoft.com/office/drawing/2014/main" id="{1147EF93-3ACF-E047-A088-9A07BDD47814}"/>
               </a:ext>
             </a:extLst>
           </p:cNvPr>
@@ -10093,8 +10093,8 @@
         </p:blipFill>
         <p:spPr>
           <a:xfrm rot="5400000">
-            <a:off x="4589653" y="1340739"/>
-            <a:ext cx="3012694" cy="4176522"/>
+            <a:off x="4520138" y="1304734"/>
+            <a:ext cx="3064637" cy="4248531"/>
           </a:xfrm>
           <a:prstGeom prst="rect">
             <a:avLst/>
@@ -10103,10 +10103,10 @@
       </p:pic>
       <p:pic>
         <p:nvPicPr>
-          <p:cNvPr id="12" name="Picture 11">
+          <p:cNvPr id="13" name="Picture 12">
             <a:extLst>
               <a:ext uri="{FF2B5EF4-FFF2-40B4-BE49-F238E27FC236}">
-                <a16:creationId xmlns:a16="http://schemas.microsoft.com/office/drawing/2014/main" id="{659BB3FB-D109-B94B-A8C2-067E4726D237}"/>
+                <a16:creationId xmlns:a16="http://schemas.microsoft.com/office/drawing/2014/main" id="{37FED2CA-3A4B-C74E-84B4-6AF2B0FA6FDB}"/>
               </a:ext>
             </a:extLst>
           </p:cNvPr>
@@ -10123,8 +10123,8 @@
         </p:blipFill>
         <p:spPr>
           <a:xfrm rot="5400000">
-            <a:off x="8597392" y="1340739"/>
-            <a:ext cx="3012694" cy="4176522"/>
+            <a:off x="8535415" y="1304734"/>
+            <a:ext cx="3064637" cy="4248531"/>
           </a:xfrm>
           <a:prstGeom prst="rect">
             <a:avLst/>
@@ -10178,7 +10178,7 @@
           <a:p>
             <a:fld id="{37E2C1DD-94AF-5B41-A54A-0C8426B7BC1A}" type="datetime1">
               <a:rPr lang="en-US" smtClean="0"/>
-              <a:t>6/23/20</a:t>
+              <a:t>6/24/20</a:t>
             </a:fld>
             <a:endParaRPr lang="en-US" dirty="0"/>
           </a:p>
@@ -10295,7 +10295,7 @@
             </a:r>
             <a:r>
               <a:rPr lang="en-US" sz="2200" dirty="0"/>
-              <a:t> status report</a:t>
+              <a:t> status report today</a:t>
             </a:r>
           </a:p>
           <a:p>
@@ -10331,8 +10331,15 @@
             </a:pPr>
             <a:r>
               <a:rPr lang="en-US" sz="2200" dirty="0"/>
-              <a:t>Playing with binning</a:t>
-            </a:r>
+              <a:t>Binning </a:t>
+            </a:r>
+            <a:r>
+              <a:rPr lang="en-US" sz="2200" dirty="0">
+                <a:sym typeface="Wingdings" pitchFamily="2" charset="2"/>
+              </a:rPr>
+              <a:t> Threshold ~20 events/bin</a:t>
+            </a:r>
+            <a:endParaRPr lang="en-US" sz="2200" dirty="0"/>
           </a:p>
           <a:p>
             <a:pPr marL="742950" lvl="1" indent="-285750">
@@ -10352,15 +10359,7 @@
             </a:r>
             <a:r>
               <a:rPr lang="en-US" sz="2200" dirty="0"/>
-              <a:t> bins ≈ gen bins for the </a:t>
-            </a:r>
-            <a:r>
-              <a:rPr lang="en-US" sz="2200" dirty="0" err="1"/>
-              <a:t>dijet</a:t>
-            </a:r>
-            <a:r>
-              <a:rPr lang="en-US" sz="2200" dirty="0"/>
-              <a:t> variables </a:t>
+              <a:t> bins ≈ gen bins for the di-jet variables</a:t>
             </a:r>
           </a:p>
           <a:p>
@@ -10410,7 +10409,10 @@
               <a:rPr lang="en-US" sz="2200" dirty="0" err="1"/>
               <a:t>Subleading</a:t>
             </a:r>
-            <a:endParaRPr lang="en-US" sz="2200" dirty="0"/>
+            <a:r>
+              <a:rPr lang="en-US" sz="2200" dirty="0"/>
+              <a:t> jets</a:t>
+            </a:r>
           </a:p>
           <a:p>
             <a:pPr marL="742950" lvl="1" indent="-285750">
@@ -10652,7 +10654,7 @@
           <a:p>
             <a:fld id="{D52D66B2-0E0A-F441-A1DA-8039F615D612}" type="datetime1">
               <a:rPr lang="en-US" smtClean="0"/>
-              <a:t>6/23/20</a:t>
+              <a:t>6/24/20</a:t>
             </a:fld>
             <a:endParaRPr lang="en-US" dirty="0"/>
           </a:p>
@@ -10660,10 +10662,10 @@
       </p:sp>
       <p:pic>
         <p:nvPicPr>
-          <p:cNvPr id="10" name="Picture 9">
+          <p:cNvPr id="9" name="Picture 8">
             <a:extLst>
               <a:ext uri="{FF2B5EF4-FFF2-40B4-BE49-F238E27FC236}">
-                <a16:creationId xmlns:a16="http://schemas.microsoft.com/office/drawing/2014/main" id="{F3CE2327-6869-B74E-8FC6-33AE610EAAA7}"/>
+                <a16:creationId xmlns:a16="http://schemas.microsoft.com/office/drawing/2014/main" id="{441F986D-B8CE-DF4E-A006-3A9CEF3C2A4C}"/>
               </a:ext>
             </a:extLst>
           </p:cNvPr>
@@ -10680,8 +10682,8 @@
         </p:blipFill>
         <p:spPr>
           <a:xfrm rot="5400000">
-            <a:off x="2347633" y="2818510"/>
-            <a:ext cx="3012694" cy="4176522"/>
+            <a:off x="2153865" y="2811148"/>
+            <a:ext cx="3064637" cy="4248531"/>
           </a:xfrm>
           <a:prstGeom prst="rect">
             <a:avLst/>
@@ -10690,10 +10692,10 @@
       </p:pic>
       <p:pic>
         <p:nvPicPr>
-          <p:cNvPr id="16" name="Picture 15">
+          <p:cNvPr id="15" name="Picture 14">
             <a:extLst>
               <a:ext uri="{FF2B5EF4-FFF2-40B4-BE49-F238E27FC236}">
-                <a16:creationId xmlns:a16="http://schemas.microsoft.com/office/drawing/2014/main" id="{198033AD-265A-7F4E-86D3-11ACC36D8C3A}"/>
+                <a16:creationId xmlns:a16="http://schemas.microsoft.com/office/drawing/2014/main" id="{623D0D1A-5A23-A94D-BA27-FE66B170592A}"/>
               </a:ext>
             </a:extLst>
           </p:cNvPr>
@@ -10710,8 +10712,8 @@
         </p:blipFill>
         <p:spPr>
           <a:xfrm rot="5400000">
-            <a:off x="6295547" y="2830742"/>
-            <a:ext cx="3012694" cy="4176522"/>
+            <a:off x="6687947" y="2837053"/>
+            <a:ext cx="3064637" cy="4248531"/>
           </a:xfrm>
           <a:prstGeom prst="rect">
             <a:avLst/>
@@ -10720,10 +10722,10 @@
       </p:pic>
       <p:pic>
         <p:nvPicPr>
-          <p:cNvPr id="6" name="Picture 5">
+          <p:cNvPr id="4" name="Picture 3">
             <a:extLst>
               <a:ext uri="{FF2B5EF4-FFF2-40B4-BE49-F238E27FC236}">
-                <a16:creationId xmlns:a16="http://schemas.microsoft.com/office/drawing/2014/main" id="{A3EA464A-048C-5D42-8E6C-8E9D05565D54}"/>
+                <a16:creationId xmlns:a16="http://schemas.microsoft.com/office/drawing/2014/main" id="{D239D90F-DD75-6045-8B9C-75145056F300}"/>
               </a:ext>
             </a:extLst>
           </p:cNvPr>
@@ -10740,8 +10742,8 @@
         </p:blipFill>
         <p:spPr>
           <a:xfrm rot="5400000">
-            <a:off x="2347633" y="-46669"/>
-            <a:ext cx="3012694" cy="4176522"/>
+            <a:off x="2153866" y="-43584"/>
+            <a:ext cx="3064637" cy="4248531"/>
           </a:xfrm>
           <a:prstGeom prst="rect">
             <a:avLst/>
@@ -10750,10 +10752,10 @@
       </p:pic>
       <p:pic>
         <p:nvPicPr>
-          <p:cNvPr id="13" name="Picture 12">
+          <p:cNvPr id="12" name="Picture 11">
             <a:extLst>
               <a:ext uri="{FF2B5EF4-FFF2-40B4-BE49-F238E27FC236}">
-                <a16:creationId xmlns:a16="http://schemas.microsoft.com/office/drawing/2014/main" id="{69E12872-9598-7142-80BD-635BBAC57387}"/>
+                <a16:creationId xmlns:a16="http://schemas.microsoft.com/office/drawing/2014/main" id="{C3DEDC86-70E0-D74B-B7EA-5F38F47B3658}"/>
               </a:ext>
             </a:extLst>
           </p:cNvPr>
@@ -10770,8 +10772,8 @@
         </p:blipFill>
         <p:spPr>
           <a:xfrm rot="5400000">
-            <a:off x="6305850" y="-40810"/>
-            <a:ext cx="3012694" cy="4176522"/>
+            <a:off x="6687947" y="-43585"/>
+            <a:ext cx="3064637" cy="4248531"/>
           </a:xfrm>
           <a:prstGeom prst="rect">
             <a:avLst/>
@@ -10925,7 +10927,7 @@
           <a:p>
             <a:fld id="{D52D66B2-0E0A-F441-A1DA-8039F615D612}" type="datetime1">
               <a:rPr lang="en-US" smtClean="0"/>
-              <a:t>6/23/20</a:t>
+              <a:t>6/24/20</a:t>
             </a:fld>
             <a:endParaRPr lang="en-US" dirty="0"/>
           </a:p>
@@ -10933,10 +10935,10 @@
       </p:sp>
       <p:pic>
         <p:nvPicPr>
-          <p:cNvPr id="4" name="Picture 3">
+          <p:cNvPr id="6" name="Picture 5">
             <a:extLst>
               <a:ext uri="{FF2B5EF4-FFF2-40B4-BE49-F238E27FC236}">
-                <a16:creationId xmlns:a16="http://schemas.microsoft.com/office/drawing/2014/main" id="{7A0FDE6F-D5BD-0E40-B309-03D381CB58E1}"/>
+                <a16:creationId xmlns:a16="http://schemas.microsoft.com/office/drawing/2014/main" id="{EBD64840-1DDD-A344-A8EA-4FC29ADD7E81}"/>
               </a:ext>
             </a:extLst>
           </p:cNvPr>
@@ -10953,8 +10955,8 @@
         </p:blipFill>
         <p:spPr>
           <a:xfrm rot="5400000">
-            <a:off x="8510306" y="1340739"/>
-            <a:ext cx="3012694" cy="4176522"/>
+            <a:off x="591947" y="1304734"/>
+            <a:ext cx="3064637" cy="4248531"/>
           </a:xfrm>
           <a:prstGeom prst="rect">
             <a:avLst/>
@@ -10963,10 +10965,10 @@
       </p:pic>
       <p:pic>
         <p:nvPicPr>
-          <p:cNvPr id="9" name="Picture 8">
+          <p:cNvPr id="10" name="Picture 9">
             <a:extLst>
               <a:ext uri="{FF2B5EF4-FFF2-40B4-BE49-F238E27FC236}">
-                <a16:creationId xmlns:a16="http://schemas.microsoft.com/office/drawing/2014/main" id="{F537B837-1023-3648-ADAA-C6A0DA106F8C}"/>
+                <a16:creationId xmlns:a16="http://schemas.microsoft.com/office/drawing/2014/main" id="{D68F33E2-91F0-8A45-A1AB-3507F584189F}"/>
               </a:ext>
             </a:extLst>
           </p:cNvPr>
@@ -10983,8 +10985,8 @@
         </p:blipFill>
         <p:spPr>
           <a:xfrm rot="5400000">
-            <a:off x="4420872" y="1340739"/>
-            <a:ext cx="3012694" cy="4176522"/>
+            <a:off x="4563683" y="1304734"/>
+            <a:ext cx="3064637" cy="4248531"/>
           </a:xfrm>
           <a:prstGeom prst="rect">
             <a:avLst/>
@@ -10993,10 +10995,10 @@
       </p:pic>
       <p:pic>
         <p:nvPicPr>
-          <p:cNvPr id="12" name="Picture 11">
+          <p:cNvPr id="13" name="Picture 12">
             <a:extLst>
               <a:ext uri="{FF2B5EF4-FFF2-40B4-BE49-F238E27FC236}">
-                <a16:creationId xmlns:a16="http://schemas.microsoft.com/office/drawing/2014/main" id="{074DB2E3-9D18-CE42-B86F-9F62B57EF620}"/>
+                <a16:creationId xmlns:a16="http://schemas.microsoft.com/office/drawing/2014/main" id="{796C405F-9980-0640-92DF-9801F47FCAAC}"/>
               </a:ext>
             </a:extLst>
           </p:cNvPr>
@@ -11013,8 +11015,8 @@
         </p:blipFill>
         <p:spPr>
           <a:xfrm rot="5400000">
-            <a:off x="581914" y="1340739"/>
-            <a:ext cx="3012694" cy="4176522"/>
+            <a:off x="8535418" y="1304733"/>
+            <a:ext cx="3064637" cy="4248531"/>
           </a:xfrm>
           <a:prstGeom prst="rect">
             <a:avLst/>
@@ -11168,7 +11170,7 @@
           <a:p>
             <a:fld id="{D52D66B2-0E0A-F441-A1DA-8039F615D612}" type="datetime1">
               <a:rPr lang="en-US" smtClean="0"/>
-              <a:t>6/23/20</a:t>
+              <a:t>6/24/20</a:t>
             </a:fld>
             <a:endParaRPr lang="en-US" dirty="0"/>
           </a:p>
@@ -11176,10 +11178,10 @@
       </p:sp>
       <p:pic>
         <p:nvPicPr>
-          <p:cNvPr id="6" name="Picture 5">
+          <p:cNvPr id="17" name="Picture 16">
             <a:extLst>
               <a:ext uri="{FF2B5EF4-FFF2-40B4-BE49-F238E27FC236}">
-                <a16:creationId xmlns:a16="http://schemas.microsoft.com/office/drawing/2014/main" id="{66F6105D-FC57-8B4E-8BB2-C3131BF5C40E}"/>
+                <a16:creationId xmlns:a16="http://schemas.microsoft.com/office/drawing/2014/main" id="{19F2A9C8-8910-944E-A974-2A93A57BE447}"/>
               </a:ext>
             </a:extLst>
           </p:cNvPr>
@@ -11196,8 +11198,8 @@
         </p:blipFill>
         <p:spPr>
           <a:xfrm rot="5400000">
-            <a:off x="581914" y="1340739"/>
-            <a:ext cx="3012694" cy="4176522"/>
+            <a:off x="591947" y="1304734"/>
+            <a:ext cx="3064637" cy="4248531"/>
           </a:xfrm>
           <a:prstGeom prst="rect">
             <a:avLst/>
@@ -11206,10 +11208,10 @@
       </p:pic>
       <p:pic>
         <p:nvPicPr>
-          <p:cNvPr id="10" name="Picture 9">
+          <p:cNvPr id="19" name="Picture 18">
             <a:extLst>
               <a:ext uri="{FF2B5EF4-FFF2-40B4-BE49-F238E27FC236}">
-                <a16:creationId xmlns:a16="http://schemas.microsoft.com/office/drawing/2014/main" id="{DCBDBF50-C527-314F-A86F-116D9A5D443F}"/>
+                <a16:creationId xmlns:a16="http://schemas.microsoft.com/office/drawing/2014/main" id="{CBBBEC59-A823-1340-8B27-26159C0C2E7D}"/>
               </a:ext>
             </a:extLst>
           </p:cNvPr>
@@ -11226,8 +11228,8 @@
         </p:blipFill>
         <p:spPr>
           <a:xfrm rot="5400000">
-            <a:off x="4546110" y="1340739"/>
-            <a:ext cx="3012694" cy="4176522"/>
+            <a:off x="4520138" y="1304733"/>
+            <a:ext cx="3064637" cy="4248531"/>
           </a:xfrm>
           <a:prstGeom prst="rect">
             <a:avLst/>
@@ -11236,10 +11238,10 @@
       </p:pic>
       <p:pic>
         <p:nvPicPr>
-          <p:cNvPr id="13" name="Picture 12">
+          <p:cNvPr id="21" name="Picture 20">
             <a:extLst>
               <a:ext uri="{FF2B5EF4-FFF2-40B4-BE49-F238E27FC236}">
-                <a16:creationId xmlns:a16="http://schemas.microsoft.com/office/drawing/2014/main" id="{F952864B-7FAB-AF4B-8A5E-3BE03953D4F6}"/>
+                <a16:creationId xmlns:a16="http://schemas.microsoft.com/office/drawing/2014/main" id="{9D48572F-CB49-174D-B56E-10851EE929C8}"/>
               </a:ext>
             </a:extLst>
           </p:cNvPr>
@@ -11256,8 +11258,8 @@
         </p:blipFill>
         <p:spPr>
           <a:xfrm rot="5400000">
-            <a:off x="8597394" y="1340739"/>
-            <a:ext cx="3012694" cy="4176522"/>
+            <a:off x="8535418" y="1304733"/>
+            <a:ext cx="3064637" cy="4248531"/>
           </a:xfrm>
           <a:prstGeom prst="rect">
             <a:avLst/>
@@ -11411,7 +11413,7 @@
           <a:p>
             <a:fld id="{D52D66B2-0E0A-F441-A1DA-8039F615D612}" type="datetime1">
               <a:rPr lang="en-US" smtClean="0"/>
-              <a:t>6/23/20</a:t>
+              <a:t>6/24/20</a:t>
             </a:fld>
             <a:endParaRPr lang="en-US" dirty="0"/>
           </a:p>
@@ -11419,10 +11421,10 @@
       </p:sp>
       <p:pic>
         <p:nvPicPr>
-          <p:cNvPr id="9" name="Picture 8">
+          <p:cNvPr id="10" name="Picture 9">
             <a:extLst>
               <a:ext uri="{FF2B5EF4-FFF2-40B4-BE49-F238E27FC236}">
-                <a16:creationId xmlns:a16="http://schemas.microsoft.com/office/drawing/2014/main" id="{549A792F-CB1E-2E45-B275-D2D52D58E483}"/>
+                <a16:creationId xmlns:a16="http://schemas.microsoft.com/office/drawing/2014/main" id="{2ED37B98-DA3B-0047-9D65-18D8F0E42AD0}"/>
               </a:ext>
             </a:extLst>
           </p:cNvPr>
@@ -11439,8 +11441,8 @@
         </p:blipFill>
         <p:spPr>
           <a:xfrm rot="5400000">
-            <a:off x="2286902" y="2740962"/>
-            <a:ext cx="3012694" cy="4176522"/>
+            <a:off x="2153624" y="2837053"/>
+            <a:ext cx="3064637" cy="4248531"/>
           </a:xfrm>
           <a:prstGeom prst="rect">
             <a:avLst/>
@@ -11449,10 +11451,10 @@
       </p:pic>
       <p:pic>
         <p:nvPicPr>
-          <p:cNvPr id="15" name="Picture 14">
+          <p:cNvPr id="11" name="Picture 10">
             <a:extLst>
               <a:ext uri="{FF2B5EF4-FFF2-40B4-BE49-F238E27FC236}">
-                <a16:creationId xmlns:a16="http://schemas.microsoft.com/office/drawing/2014/main" id="{B95AC1C2-AF4B-7142-A1BC-2CDC3619AFB3}"/>
+                <a16:creationId xmlns:a16="http://schemas.microsoft.com/office/drawing/2014/main" id="{AF6B808A-0560-5448-B54C-4B8B47751D22}"/>
               </a:ext>
             </a:extLst>
           </p:cNvPr>
@@ -11469,8 +11471,8 @@
         </p:blipFill>
         <p:spPr>
           <a:xfrm rot="5400000">
-            <a:off x="6463424" y="2740962"/>
-            <a:ext cx="3012694" cy="4176522"/>
+            <a:off x="6687947" y="2837053"/>
+            <a:ext cx="3064637" cy="4248531"/>
           </a:xfrm>
           <a:prstGeom prst="rect">
             <a:avLst/>
@@ -11479,10 +11481,10 @@
       </p:pic>
       <p:pic>
         <p:nvPicPr>
-          <p:cNvPr id="4" name="Picture 3">
+          <p:cNvPr id="13" name="Picture 12">
             <a:extLst>
               <a:ext uri="{FF2B5EF4-FFF2-40B4-BE49-F238E27FC236}">
-                <a16:creationId xmlns:a16="http://schemas.microsoft.com/office/drawing/2014/main" id="{83BB8A12-8705-AE4F-ABF4-E79BBB0E904A}"/>
+                <a16:creationId xmlns:a16="http://schemas.microsoft.com/office/drawing/2014/main" id="{801DB0EE-E0B1-F24D-A7D7-24AC8E271F73}"/>
               </a:ext>
             </a:extLst>
           </p:cNvPr>
@@ -11499,8 +11501,8 @@
         </p:blipFill>
         <p:spPr>
           <a:xfrm rot="5400000">
-            <a:off x="2286902" y="-86561"/>
-            <a:ext cx="3012694" cy="4176522"/>
+            <a:off x="2153866" y="-35637"/>
+            <a:ext cx="3064637" cy="4248531"/>
           </a:xfrm>
           <a:prstGeom prst="rect">
             <a:avLst/>
@@ -11509,10 +11511,10 @@
       </p:pic>
       <p:pic>
         <p:nvPicPr>
-          <p:cNvPr id="12" name="Picture 11">
+          <p:cNvPr id="14" name="Picture 13">
             <a:extLst>
               <a:ext uri="{FF2B5EF4-FFF2-40B4-BE49-F238E27FC236}">
-                <a16:creationId xmlns:a16="http://schemas.microsoft.com/office/drawing/2014/main" id="{A3733EB8-12C0-BC49-B5CD-888FD455C3F4}"/>
+                <a16:creationId xmlns:a16="http://schemas.microsoft.com/office/drawing/2014/main" id="{DC319452-4FEF-6E4C-8694-9C0704052526}"/>
               </a:ext>
             </a:extLst>
           </p:cNvPr>
@@ -11529,8 +11531,8 @@
         </p:blipFill>
         <p:spPr>
           <a:xfrm rot="5400000">
-            <a:off x="6463424" y="-59484"/>
-            <a:ext cx="3012694" cy="4176522"/>
+            <a:off x="6687947" y="-35638"/>
+            <a:ext cx="3064637" cy="4248531"/>
           </a:xfrm>
           <a:prstGeom prst="rect">
             <a:avLst/>
@@ -11684,7 +11686,7 @@
           <a:p>
             <a:fld id="{D52D66B2-0E0A-F441-A1DA-8039F615D612}" type="datetime1">
               <a:rPr lang="en-US" smtClean="0"/>
-              <a:t>6/23/20</a:t>
+              <a:t>6/24/20</a:t>
             </a:fld>
             <a:endParaRPr lang="en-US" dirty="0"/>
           </a:p>
@@ -11764,10 +11766,10 @@
       </p:sp>
       <p:pic>
         <p:nvPicPr>
-          <p:cNvPr id="6" name="Picture 5">
+          <p:cNvPr id="4" name="Picture 3">
             <a:extLst>
               <a:ext uri="{FF2B5EF4-FFF2-40B4-BE49-F238E27FC236}">
-                <a16:creationId xmlns:a16="http://schemas.microsoft.com/office/drawing/2014/main" id="{18EA22A3-6832-F047-BE99-DAC5A6ED678B}"/>
+                <a16:creationId xmlns:a16="http://schemas.microsoft.com/office/drawing/2014/main" id="{891D9D8F-6302-E148-B768-DB338DAECD61}"/>
               </a:ext>
             </a:extLst>
           </p:cNvPr>
@@ -11784,7 +11786,7 @@
         </p:blipFill>
         <p:spPr>
           <a:xfrm rot="5400000">
-            <a:off x="1273365" y="605399"/>
+            <a:off x="951992" y="440626"/>
             <a:ext cx="4311269" cy="5976747"/>
           </a:xfrm>
           <a:prstGeom prst="rect">
@@ -11794,10 +11796,10 @@
       </p:pic>
       <p:pic>
         <p:nvPicPr>
-          <p:cNvPr id="12" name="Picture 11">
+          <p:cNvPr id="9" name="Picture 8">
             <a:extLst>
               <a:ext uri="{FF2B5EF4-FFF2-40B4-BE49-F238E27FC236}">
-                <a16:creationId xmlns:a16="http://schemas.microsoft.com/office/drawing/2014/main" id="{A856D5B9-4E2A-BC43-89E6-13C7581B925A}"/>
+                <a16:creationId xmlns:a16="http://schemas.microsoft.com/office/drawing/2014/main" id="{934BADDA-4A68-A848-952E-E92DD5DC944C}"/>
               </a:ext>
             </a:extLst>
           </p:cNvPr>
@@ -11814,7 +11816,7 @@
         </p:blipFill>
         <p:spPr>
           <a:xfrm rot="5400000">
-            <a:off x="6885196" y="605398"/>
+            <a:off x="6885195" y="440625"/>
             <a:ext cx="4311269" cy="5976747"/>
           </a:xfrm>
           <a:prstGeom prst="rect">
@@ -11972,7 +11974,7 @@
           <a:p>
             <a:fld id="{F7AFF6A5-F1FB-284A-BF72-2836D5A0B341}" type="datetime1">
               <a:rPr lang="en-US" smtClean="0"/>
-              <a:t>6/23/20</a:t>
+              <a:t>6/24/20</a:t>
             </a:fld>
             <a:endParaRPr lang="en-US" dirty="0"/>
           </a:p>
@@ -13039,7 +13041,7 @@
           <a:p>
             <a:fld id="{D52D66B2-0E0A-F441-A1DA-8039F615D612}" type="datetime1">
               <a:rPr lang="en-US" smtClean="0"/>
-              <a:t>6/23/20</a:t>
+              <a:t>6/24/20</a:t>
             </a:fld>
             <a:endParaRPr lang="en-US" dirty="0"/>
           </a:p>
@@ -13047,10 +13049,10 @@
       </p:sp>
       <p:pic>
         <p:nvPicPr>
-          <p:cNvPr id="4" name="Picture 3">
+          <p:cNvPr id="6" name="Picture 5">
             <a:extLst>
               <a:ext uri="{FF2B5EF4-FFF2-40B4-BE49-F238E27FC236}">
-                <a16:creationId xmlns:a16="http://schemas.microsoft.com/office/drawing/2014/main" id="{894B86BE-A80E-DE44-A4F0-E66E28E160B3}"/>
+                <a16:creationId xmlns:a16="http://schemas.microsoft.com/office/drawing/2014/main" id="{FC02CBFD-FC07-F74D-BB3B-96A4D77ABACD}"/>
               </a:ext>
             </a:extLst>
           </p:cNvPr>
@@ -13067,8 +13069,8 @@
         </p:blipFill>
         <p:spPr>
           <a:xfrm rot="5400000">
-            <a:off x="8394111" y="1340739"/>
-            <a:ext cx="3012694" cy="4176522"/>
+            <a:off x="591947" y="1304734"/>
+            <a:ext cx="3064637" cy="4248531"/>
           </a:xfrm>
           <a:prstGeom prst="rect">
             <a:avLst/>
@@ -13077,10 +13079,10 @@
       </p:pic>
       <p:pic>
         <p:nvPicPr>
-          <p:cNvPr id="9" name="Picture 8">
+          <p:cNvPr id="10" name="Picture 9">
             <a:extLst>
               <a:ext uri="{FF2B5EF4-FFF2-40B4-BE49-F238E27FC236}">
-                <a16:creationId xmlns:a16="http://schemas.microsoft.com/office/drawing/2014/main" id="{62593975-4425-9449-99F9-98EC84DA30A2}"/>
+                <a16:creationId xmlns:a16="http://schemas.microsoft.com/office/drawing/2014/main" id="{7AE0DE77-3C5A-0349-AD6F-ED14DA0B854D}"/>
               </a:ext>
             </a:extLst>
           </p:cNvPr>
@@ -13097,8 +13099,8 @@
         </p:blipFill>
         <p:spPr>
           <a:xfrm rot="5400000">
-            <a:off x="4420872" y="1340739"/>
-            <a:ext cx="3012694" cy="4176522"/>
+            <a:off x="8535416" y="1304733"/>
+            <a:ext cx="3064637" cy="4248531"/>
           </a:xfrm>
           <a:prstGeom prst="rect">
             <a:avLst/>
@@ -13107,10 +13109,10 @@
       </p:pic>
       <p:pic>
         <p:nvPicPr>
-          <p:cNvPr id="12" name="Picture 11">
+          <p:cNvPr id="13" name="Picture 12">
             <a:extLst>
               <a:ext uri="{FF2B5EF4-FFF2-40B4-BE49-F238E27FC236}">
-                <a16:creationId xmlns:a16="http://schemas.microsoft.com/office/drawing/2014/main" id="{7A489B6B-A957-6A4E-A584-B2C68EC330AE}"/>
+                <a16:creationId xmlns:a16="http://schemas.microsoft.com/office/drawing/2014/main" id="{CD3C4A93-9D64-1844-A9D1-BA8EFC34B340}"/>
               </a:ext>
             </a:extLst>
           </p:cNvPr>
@@ -13127,8 +13129,8 @@
         </p:blipFill>
         <p:spPr>
           <a:xfrm rot="5400000">
-            <a:off x="581914" y="1340739"/>
-            <a:ext cx="3012694" cy="4176522"/>
+            <a:off x="4520138" y="1304733"/>
+            <a:ext cx="3064637" cy="4248531"/>
           </a:xfrm>
           <a:prstGeom prst="rect">
             <a:avLst/>
@@ -13274,7 +13276,7 @@
           <a:p>
             <a:fld id="{D52D66B2-0E0A-F441-A1DA-8039F615D612}" type="datetime1">
               <a:rPr lang="en-US" smtClean="0"/>
-              <a:t>6/23/20</a:t>
+              <a:t>6/24/20</a:t>
             </a:fld>
             <a:endParaRPr lang="en-US" dirty="0"/>
           </a:p>
@@ -13282,10 +13284,10 @@
       </p:sp>
       <p:pic>
         <p:nvPicPr>
-          <p:cNvPr id="4" name="Picture 3">
+          <p:cNvPr id="6" name="Picture 5">
             <a:extLst>
               <a:ext uri="{FF2B5EF4-FFF2-40B4-BE49-F238E27FC236}">
-                <a16:creationId xmlns:a16="http://schemas.microsoft.com/office/drawing/2014/main" id="{2D0FDE46-F664-5045-95F9-3BD050C0F1D5}"/>
+                <a16:creationId xmlns:a16="http://schemas.microsoft.com/office/drawing/2014/main" id="{A3DEB63E-21C5-334B-8C97-1948CD4C75F2}"/>
               </a:ext>
             </a:extLst>
           </p:cNvPr>
@@ -13302,8 +13304,8 @@
         </p:blipFill>
         <p:spPr>
           <a:xfrm rot="5400000">
-            <a:off x="686663" y="1340739"/>
-            <a:ext cx="3012694" cy="4176522"/>
+            <a:off x="591947" y="1304734"/>
+            <a:ext cx="3064637" cy="4248531"/>
           </a:xfrm>
           <a:prstGeom prst="rect">
             <a:avLst/>
@@ -13312,10 +13314,10 @@
       </p:pic>
       <p:pic>
         <p:nvPicPr>
-          <p:cNvPr id="8" name="Picture 7">
+          <p:cNvPr id="11" name="Picture 10">
             <a:extLst>
               <a:ext uri="{FF2B5EF4-FFF2-40B4-BE49-F238E27FC236}">
-                <a16:creationId xmlns:a16="http://schemas.microsoft.com/office/drawing/2014/main" id="{7D2FEC7C-01DB-0944-B36C-BD4C7ABAF5C8}"/>
+                <a16:creationId xmlns:a16="http://schemas.microsoft.com/office/drawing/2014/main" id="{697514EB-D22A-1D44-8125-95BEE6B9E722}"/>
               </a:ext>
             </a:extLst>
           </p:cNvPr>
@@ -13332,8 +13334,8 @@
         </p:blipFill>
         <p:spPr>
           <a:xfrm rot="5400000">
-            <a:off x="4546110" y="1340739"/>
-            <a:ext cx="3012694" cy="4176522"/>
+            <a:off x="4520138" y="1304733"/>
+            <a:ext cx="3064637" cy="4248531"/>
           </a:xfrm>
           <a:prstGeom prst="rect">
             <a:avLst/>
@@ -13342,10 +13344,10 @@
       </p:pic>
       <p:pic>
         <p:nvPicPr>
-          <p:cNvPr id="10" name="Picture 9">
+          <p:cNvPr id="13" name="Picture 12">
             <a:extLst>
               <a:ext uri="{FF2B5EF4-FFF2-40B4-BE49-F238E27FC236}">
-                <a16:creationId xmlns:a16="http://schemas.microsoft.com/office/drawing/2014/main" id="{E792520E-22F4-414D-A560-14CA86EEE67F}"/>
+                <a16:creationId xmlns:a16="http://schemas.microsoft.com/office/drawing/2014/main" id="{41DE5DCD-8214-8545-B46A-10EE27F39FD1}"/>
               </a:ext>
             </a:extLst>
           </p:cNvPr>
@@ -13362,8 +13364,8 @@
         </p:blipFill>
         <p:spPr>
           <a:xfrm rot="5400000">
-            <a:off x="8510306" y="1340739"/>
-            <a:ext cx="3012694" cy="4176522"/>
+            <a:off x="8535416" y="1304732"/>
+            <a:ext cx="3064637" cy="4248531"/>
           </a:xfrm>
           <a:prstGeom prst="rect">
             <a:avLst/>
@@ -13509,7 +13511,7 @@
           <a:p>
             <a:fld id="{D52D66B2-0E0A-F441-A1DA-8039F615D612}" type="datetime1">
               <a:rPr lang="en-US" smtClean="0"/>
-              <a:t>6/23/20</a:t>
+              <a:t>6/24/20</a:t>
             </a:fld>
             <a:endParaRPr lang="en-US" dirty="0"/>
           </a:p>
@@ -13517,10 +13519,10 @@
       </p:sp>
       <p:pic>
         <p:nvPicPr>
-          <p:cNvPr id="8" name="Picture 7">
+          <p:cNvPr id="11" name="Picture 10">
             <a:extLst>
               <a:ext uri="{FF2B5EF4-FFF2-40B4-BE49-F238E27FC236}">
-                <a16:creationId xmlns:a16="http://schemas.microsoft.com/office/drawing/2014/main" id="{D31FBB30-898C-0A4F-97D9-575A2B392766}"/>
+                <a16:creationId xmlns:a16="http://schemas.microsoft.com/office/drawing/2014/main" id="{F3A9627C-2C79-964C-BC7B-FF8E06163D6B}"/>
               </a:ext>
             </a:extLst>
           </p:cNvPr>
@@ -13537,8 +13539,8 @@
         </p:blipFill>
         <p:spPr>
           <a:xfrm rot="5400000">
-            <a:off x="2063204" y="2768039"/>
-            <a:ext cx="3012694" cy="4176522"/>
+            <a:off x="2037231" y="2837053"/>
+            <a:ext cx="3064637" cy="4248531"/>
           </a:xfrm>
           <a:prstGeom prst="rect">
             <a:avLst/>
@@ -13547,10 +13549,10 @@
       </p:pic>
       <p:pic>
         <p:nvPicPr>
-          <p:cNvPr id="12" name="Picture 11">
+          <p:cNvPr id="16" name="Picture 15">
             <a:extLst>
               <a:ext uri="{FF2B5EF4-FFF2-40B4-BE49-F238E27FC236}">
-                <a16:creationId xmlns:a16="http://schemas.microsoft.com/office/drawing/2014/main" id="{385B1381-8C71-F845-91A2-C518CA9EF8B8}"/>
+                <a16:creationId xmlns:a16="http://schemas.microsoft.com/office/drawing/2014/main" id="{F936EAA9-34D8-614C-B8E2-35ED9803270D}"/>
               </a:ext>
             </a:extLst>
           </p:cNvPr>
@@ -13567,8 +13569,8 @@
         </p:blipFill>
         <p:spPr>
           <a:xfrm rot="5400000">
-            <a:off x="6961862" y="2765617"/>
-            <a:ext cx="3012694" cy="4176522"/>
+            <a:off x="6644404" y="2837053"/>
+            <a:ext cx="3064637" cy="4248531"/>
           </a:xfrm>
           <a:prstGeom prst="rect">
             <a:avLst/>
@@ -13577,10 +13579,10 @@
       </p:pic>
       <p:pic>
         <p:nvPicPr>
-          <p:cNvPr id="4" name="Picture 3">
+          <p:cNvPr id="6" name="Picture 5">
             <a:extLst>
               <a:ext uri="{FF2B5EF4-FFF2-40B4-BE49-F238E27FC236}">
-                <a16:creationId xmlns:a16="http://schemas.microsoft.com/office/drawing/2014/main" id="{99D6A182-1DC0-9A4D-BC1A-C720C31FAF2B}"/>
+                <a16:creationId xmlns:a16="http://schemas.microsoft.com/office/drawing/2014/main" id="{F593D63F-C6F9-7146-8492-26C89EF64FEB}"/>
               </a:ext>
             </a:extLst>
           </p:cNvPr>
@@ -13597,8 +13599,8 @@
         </p:blipFill>
         <p:spPr>
           <a:xfrm rot="5400000">
-            <a:off x="2063204" y="-86561"/>
-            <a:ext cx="3012694" cy="4176522"/>
+            <a:off x="2037232" y="-56756"/>
+            <a:ext cx="3064637" cy="4248531"/>
           </a:xfrm>
           <a:prstGeom prst="rect">
             <a:avLst/>
@@ -13607,10 +13609,10 @@
       </p:pic>
       <p:pic>
         <p:nvPicPr>
-          <p:cNvPr id="10" name="Picture 9">
+          <p:cNvPr id="14" name="Picture 13">
             <a:extLst>
               <a:ext uri="{FF2B5EF4-FFF2-40B4-BE49-F238E27FC236}">
-                <a16:creationId xmlns:a16="http://schemas.microsoft.com/office/drawing/2014/main" id="{059CB2F2-B136-9141-BE06-08AC076E8A81}"/>
+                <a16:creationId xmlns:a16="http://schemas.microsoft.com/office/drawing/2014/main" id="{C00CAD3A-EAD6-6E41-9B1F-418F5BE8BFB1}"/>
               </a:ext>
             </a:extLst>
           </p:cNvPr>
@@ -13627,8 +13629,8 @@
         </p:blipFill>
         <p:spPr>
           <a:xfrm rot="5400000">
-            <a:off x="6961862" y="-86561"/>
-            <a:ext cx="3012694" cy="4176522"/>
+            <a:off x="6633766" y="-69489"/>
+            <a:ext cx="3064637" cy="4248531"/>
           </a:xfrm>
           <a:prstGeom prst="rect">
             <a:avLst/>
@@ -13782,7 +13784,7 @@
           <a:p>
             <a:fld id="{D52D66B2-0E0A-F441-A1DA-8039F615D612}" type="datetime1">
               <a:rPr lang="en-US" smtClean="0"/>
-              <a:t>6/23/20</a:t>
+              <a:t>6/24/20</a:t>
             </a:fld>
             <a:endParaRPr lang="en-US" dirty="0"/>
           </a:p>
@@ -13790,10 +13792,10 @@
       </p:sp>
       <p:pic>
         <p:nvPicPr>
-          <p:cNvPr id="6" name="Picture 5">
+          <p:cNvPr id="4" name="Picture 3">
             <a:extLst>
               <a:ext uri="{FF2B5EF4-FFF2-40B4-BE49-F238E27FC236}">
-                <a16:creationId xmlns:a16="http://schemas.microsoft.com/office/drawing/2014/main" id="{76530B6C-727F-8247-8E5C-782C50F5523D}"/>
+                <a16:creationId xmlns:a16="http://schemas.microsoft.com/office/drawing/2014/main" id="{EBD23012-5CA2-4342-ABFE-47FC00D2A528}"/>
               </a:ext>
             </a:extLst>
           </p:cNvPr>
@@ -13810,8 +13812,8 @@
         </p:blipFill>
         <p:spPr>
           <a:xfrm rot="5400000">
-            <a:off x="8394111" y="1340739"/>
-            <a:ext cx="3012694" cy="4176522"/>
+            <a:off x="591947" y="1304734"/>
+            <a:ext cx="3064637" cy="4248531"/>
           </a:xfrm>
           <a:prstGeom prst="rect">
             <a:avLst/>
@@ -13820,10 +13822,10 @@
       </p:pic>
       <p:pic>
         <p:nvPicPr>
-          <p:cNvPr id="10" name="Picture 9">
+          <p:cNvPr id="9" name="Picture 8">
             <a:extLst>
               <a:ext uri="{FF2B5EF4-FFF2-40B4-BE49-F238E27FC236}">
-                <a16:creationId xmlns:a16="http://schemas.microsoft.com/office/drawing/2014/main" id="{0207D3F1-BDED-454D-B5EF-6142F219FAD0}"/>
+                <a16:creationId xmlns:a16="http://schemas.microsoft.com/office/drawing/2014/main" id="{86EA8464-9B56-974F-9F4E-F2B02AABC1DC}"/>
               </a:ext>
             </a:extLst>
           </p:cNvPr>
@@ -13840,8 +13842,8 @@
         </p:blipFill>
         <p:spPr>
           <a:xfrm rot="5400000">
-            <a:off x="4546110" y="1340739"/>
-            <a:ext cx="3012694" cy="4176522"/>
+            <a:off x="4520138" y="1304734"/>
+            <a:ext cx="3064637" cy="4248531"/>
           </a:xfrm>
           <a:prstGeom prst="rect">
             <a:avLst/>
@@ -13850,10 +13852,10 @@
       </p:pic>
       <p:pic>
         <p:nvPicPr>
-          <p:cNvPr id="13" name="Picture 12">
+          <p:cNvPr id="12" name="Picture 11">
             <a:extLst>
               <a:ext uri="{FF2B5EF4-FFF2-40B4-BE49-F238E27FC236}">
-                <a16:creationId xmlns:a16="http://schemas.microsoft.com/office/drawing/2014/main" id="{15175C8E-DECD-D242-A2C5-B8B947B82139}"/>
+                <a16:creationId xmlns:a16="http://schemas.microsoft.com/office/drawing/2014/main" id="{355F5AC4-77D3-A148-85DF-7A23B6A10FD5}"/>
               </a:ext>
             </a:extLst>
           </p:cNvPr>
@@ -13870,8 +13872,8 @@
         </p:blipFill>
         <p:spPr>
           <a:xfrm rot="5400000">
-            <a:off x="581914" y="1340739"/>
-            <a:ext cx="3012694" cy="4176522"/>
+            <a:off x="8448329" y="1304733"/>
+            <a:ext cx="3064637" cy="4248531"/>
           </a:xfrm>
           <a:prstGeom prst="rect">
             <a:avLst/>
@@ -14025,7 +14027,7 @@
           <a:p>
             <a:fld id="{D52D66B2-0E0A-F441-A1DA-8039F615D612}" type="datetime1">
               <a:rPr lang="en-US" smtClean="0"/>
-              <a:t>6/23/20</a:t>
+              <a:t>6/24/20</a:t>
             </a:fld>
             <a:endParaRPr lang="en-US" dirty="0"/>
           </a:p>
@@ -14033,10 +14035,10 @@
       </p:sp>
       <p:pic>
         <p:nvPicPr>
-          <p:cNvPr id="6" name="Picture 5">
+          <p:cNvPr id="4" name="Picture 3">
             <a:extLst>
               <a:ext uri="{FF2B5EF4-FFF2-40B4-BE49-F238E27FC236}">
-                <a16:creationId xmlns:a16="http://schemas.microsoft.com/office/drawing/2014/main" id="{5331BE32-53AA-A94C-8DBE-8101A4EA3673}"/>
+                <a16:creationId xmlns:a16="http://schemas.microsoft.com/office/drawing/2014/main" id="{F6CB1A15-C7F7-4B45-A62D-26DE1CC98F24}"/>
               </a:ext>
             </a:extLst>
           </p:cNvPr>
@@ -14053,8 +14055,8 @@
         </p:blipFill>
         <p:spPr>
           <a:xfrm rot="5400000">
-            <a:off x="581914" y="1340739"/>
-            <a:ext cx="3012694" cy="4176522"/>
+            <a:off x="591947" y="1304734"/>
+            <a:ext cx="3064637" cy="4248531"/>
           </a:xfrm>
           <a:prstGeom prst="rect">
             <a:avLst/>
@@ -14063,10 +14065,10 @@
       </p:pic>
       <p:pic>
         <p:nvPicPr>
-          <p:cNvPr id="11" name="Picture 10">
+          <p:cNvPr id="9" name="Picture 8">
             <a:extLst>
               <a:ext uri="{FF2B5EF4-FFF2-40B4-BE49-F238E27FC236}">
-                <a16:creationId xmlns:a16="http://schemas.microsoft.com/office/drawing/2014/main" id="{B4B999B5-0AE2-CE44-A193-D307111E29E9}"/>
+                <a16:creationId xmlns:a16="http://schemas.microsoft.com/office/drawing/2014/main" id="{B17F317A-5102-5345-8DAE-2467488417DC}"/>
               </a:ext>
             </a:extLst>
           </p:cNvPr>
@@ -14083,8 +14085,8 @@
         </p:blipFill>
         <p:spPr>
           <a:xfrm rot="5400000">
-            <a:off x="4546110" y="1340739"/>
-            <a:ext cx="3012694" cy="4176522"/>
+            <a:off x="4563681" y="1304734"/>
+            <a:ext cx="3064637" cy="4248531"/>
           </a:xfrm>
           <a:prstGeom prst="rect">
             <a:avLst/>
@@ -14093,10 +14095,10 @@
       </p:pic>
       <p:pic>
         <p:nvPicPr>
-          <p:cNvPr id="13" name="Picture 12">
+          <p:cNvPr id="12" name="Picture 11">
             <a:extLst>
               <a:ext uri="{FF2B5EF4-FFF2-40B4-BE49-F238E27FC236}">
-                <a16:creationId xmlns:a16="http://schemas.microsoft.com/office/drawing/2014/main" id="{FC294658-290F-B94E-9EFC-394DDD4223A5}"/>
+                <a16:creationId xmlns:a16="http://schemas.microsoft.com/office/drawing/2014/main" id="{A8901989-02CB-394B-A664-2AB77C32926E}"/>
               </a:ext>
             </a:extLst>
           </p:cNvPr>
@@ -14113,8 +14115,8 @@
         </p:blipFill>
         <p:spPr>
           <a:xfrm rot="5400000">
-            <a:off x="8510306" y="1340739"/>
-            <a:ext cx="3012694" cy="4176522"/>
+            <a:off x="8535415" y="1304734"/>
+            <a:ext cx="3064637" cy="4248531"/>
           </a:xfrm>
           <a:prstGeom prst="rect">
             <a:avLst/>
@@ -14268,7 +14270,7 @@
           <a:p>
             <a:fld id="{D52D66B2-0E0A-F441-A1DA-8039F615D612}" type="datetime1">
               <a:rPr lang="en-US" smtClean="0"/>
-              <a:t>6/23/20</a:t>
+              <a:t>6/24/20</a:t>
             </a:fld>
             <a:endParaRPr lang="en-US" dirty="0"/>
           </a:p>
@@ -14276,10 +14278,10 @@
       </p:sp>
       <p:pic>
         <p:nvPicPr>
-          <p:cNvPr id="11" name="Picture 10">
+          <p:cNvPr id="9" name="Picture 8">
             <a:extLst>
               <a:ext uri="{FF2B5EF4-FFF2-40B4-BE49-F238E27FC236}">
-                <a16:creationId xmlns:a16="http://schemas.microsoft.com/office/drawing/2014/main" id="{15F0F367-C396-6443-9195-297007DF382B}"/>
+                <a16:creationId xmlns:a16="http://schemas.microsoft.com/office/drawing/2014/main" id="{2973698B-A8EC-4C4B-997A-411E39D000AE}"/>
               </a:ext>
             </a:extLst>
           </p:cNvPr>
@@ -14296,8 +14298,8 @@
         </p:blipFill>
         <p:spPr>
           <a:xfrm rot="5400000">
-            <a:off x="2179838" y="2865600"/>
-            <a:ext cx="3012694" cy="4176522"/>
+            <a:off x="2447618" y="2803201"/>
+            <a:ext cx="3064637" cy="4248531"/>
           </a:xfrm>
           <a:prstGeom prst="rect">
             <a:avLst/>
@@ -14306,10 +14308,10 @@
       </p:pic>
       <p:pic>
         <p:nvPicPr>
-          <p:cNvPr id="16" name="Picture 15">
+          <p:cNvPr id="15" name="Picture 14">
             <a:extLst>
               <a:ext uri="{FF2B5EF4-FFF2-40B4-BE49-F238E27FC236}">
-                <a16:creationId xmlns:a16="http://schemas.microsoft.com/office/drawing/2014/main" id="{2053AA48-193C-9144-A2AD-4453EF08A7F9}"/>
+                <a16:creationId xmlns:a16="http://schemas.microsoft.com/office/drawing/2014/main" id="{992BF602-AB12-3446-8383-9D51FC06C412}"/>
               </a:ext>
             </a:extLst>
           </p:cNvPr>
@@ -14326,8 +14328,8 @@
         </p:blipFill>
         <p:spPr>
           <a:xfrm rot="5400000">
-            <a:off x="6961862" y="2865176"/>
-            <a:ext cx="3012694" cy="4176522"/>
+            <a:off x="6976670" y="2866891"/>
+            <a:ext cx="3064637" cy="4248531"/>
           </a:xfrm>
           <a:prstGeom prst="rect">
             <a:avLst/>
@@ -14336,10 +14338,10 @@
       </p:pic>
       <p:pic>
         <p:nvPicPr>
-          <p:cNvPr id="6" name="Picture 5">
+          <p:cNvPr id="4" name="Picture 3">
             <a:extLst>
               <a:ext uri="{FF2B5EF4-FFF2-40B4-BE49-F238E27FC236}">
-                <a16:creationId xmlns:a16="http://schemas.microsoft.com/office/drawing/2014/main" id="{E396F1BF-736F-3E44-812F-A5112CC21267}"/>
+                <a16:creationId xmlns:a16="http://schemas.microsoft.com/office/drawing/2014/main" id="{E4BDF7D9-D7FF-F64D-A99A-B88F3F7BA3EE}"/>
               </a:ext>
             </a:extLst>
           </p:cNvPr>
@@ -14356,8 +14358,8 @@
         </p:blipFill>
         <p:spPr>
           <a:xfrm rot="5400000">
-            <a:off x="2179838" y="-25604"/>
-            <a:ext cx="3012694" cy="4176522"/>
+            <a:off x="2447618" y="-35637"/>
+            <a:ext cx="3064637" cy="4248531"/>
           </a:xfrm>
           <a:prstGeom prst="rect">
             <a:avLst/>
@@ -14366,10 +14368,10 @@
       </p:pic>
       <p:pic>
         <p:nvPicPr>
-          <p:cNvPr id="14" name="Picture 13">
+          <p:cNvPr id="12" name="Picture 11">
             <a:extLst>
               <a:ext uri="{FF2B5EF4-FFF2-40B4-BE49-F238E27FC236}">
-                <a16:creationId xmlns:a16="http://schemas.microsoft.com/office/drawing/2014/main" id="{C249C06C-71DE-9F43-89BA-8A50FFB5BD36}"/>
+                <a16:creationId xmlns:a16="http://schemas.microsoft.com/office/drawing/2014/main" id="{7E8AB8F1-A1CE-E541-AAF6-0BC3BDED6C22}"/>
               </a:ext>
             </a:extLst>
           </p:cNvPr>
@@ -14386,8 +14388,8 @@
         </p:blipFill>
         <p:spPr>
           <a:xfrm rot="5400000">
-            <a:off x="6961862" y="-20347"/>
-            <a:ext cx="3012694" cy="4176522"/>
+            <a:off x="6976670" y="-35637"/>
+            <a:ext cx="3064637" cy="4248531"/>
           </a:xfrm>
           <a:prstGeom prst="rect">
             <a:avLst/>

</xml_diff>